<commit_message>
Documentation diverse et Template PPTX
Documentation diverse :
> MAJ de la doc du poste de développeur
> Document de suivi de réunions Skype
> Template PPTX
</commit_message>
<xml_diff>
--- a/Documentation/3 - Documentation technique/Installation_PostesDevs_2015-06_19_v1.pptx
+++ b/Documentation/3 - Documentation technique/Installation_PostesDevs_2015-06_19_v1.pptx
@@ -5,7 +5,7 @@
     <p:sldMasterId id="2147483660" r:id="rId1"/>
   </p:sldMasterIdLst>
   <p:notesMasterIdLst>
-    <p:notesMasterId r:id="rId42"/>
+    <p:notesMasterId r:id="rId41"/>
   </p:notesMasterIdLst>
   <p:sldIdLst>
     <p:sldId id="301" r:id="rId2"/>
@@ -37,17 +37,16 @@
     <p:sldId id="383" r:id="rId28"/>
     <p:sldId id="375" r:id="rId29"/>
     <p:sldId id="377" r:id="rId30"/>
-    <p:sldId id="384" r:id="rId31"/>
-    <p:sldId id="385" r:id="rId32"/>
-    <p:sldId id="363" r:id="rId33"/>
+    <p:sldId id="363" r:id="rId31"/>
+    <p:sldId id="384" r:id="rId32"/>
+    <p:sldId id="385" r:id="rId33"/>
     <p:sldId id="353" r:id="rId34"/>
     <p:sldId id="338" r:id="rId35"/>
     <p:sldId id="344" r:id="rId36"/>
-    <p:sldId id="342" r:id="rId37"/>
-    <p:sldId id="345" r:id="rId38"/>
-    <p:sldId id="358" r:id="rId39"/>
-    <p:sldId id="360" r:id="rId40"/>
-    <p:sldId id="361" r:id="rId41"/>
+    <p:sldId id="345" r:id="rId37"/>
+    <p:sldId id="358" r:id="rId38"/>
+    <p:sldId id="360" r:id="rId39"/>
+    <p:sldId id="361" r:id="rId40"/>
   </p:sldIdLst>
   <p:sldSz cx="9144000" cy="6858000" type="screen4x3"/>
   <p:notesSz cx="6858000" cy="9144000"/>
@@ -148,7 +147,7 @@
   </p:defaultTextStyle>
   <p:extLst>
     <p:ext uri="{EFAFB233-063F-42B5-8137-9DF3F51BA10A}">
-      <p15:sldGuideLst xmlns:p15="http://schemas.microsoft.com/office/powerpoint/2012/main" xmlns="">
+      <p15:sldGuideLst xmlns:p15="http://schemas.microsoft.com/office/powerpoint/2012/main">
         <p15:guide id="1" orient="horz" pos="2160">
           <p15:clr>
             <a:srgbClr val="A4A3A4"/>
@@ -247,7 +246,7 @@
           <a:p>
             <a:fld id="{E52630F6-BB7E-4BB0-B3A1-C739EB574077}" type="datetimeFigureOut">
               <a:rPr lang="fr-FR" smtClean="0"/>
-              <a:t>19/06/2015</a:t>
+              <a:t>20/06/2015</a:t>
             </a:fld>
             <a:endParaRPr lang="fr-FR"/>
           </a:p>
@@ -3371,90 +3370,6 @@
 </p:notes>
 </file>
 
-<file path=ppt/notesSlides/notesSlide40.xml><?xml version="1.0" encoding="utf-8"?>
-<p:notes xmlns:a="http://schemas.openxmlformats.org/drawingml/2006/main" xmlns:r="http://schemas.openxmlformats.org/officeDocument/2006/relationships" xmlns:p="http://schemas.openxmlformats.org/presentationml/2006/main">
-  <p:cSld>
-    <p:spTree>
-      <p:nvGrpSpPr>
-        <p:cNvPr id="1" name=""/>
-        <p:cNvGrpSpPr/>
-        <p:nvPr/>
-      </p:nvGrpSpPr>
-      <p:grpSpPr>
-        <a:xfrm>
-          <a:off x="0" y="0"/>
-          <a:ext cx="0" cy="0"/>
-          <a:chOff x="0" y="0"/>
-          <a:chExt cx="0" cy="0"/>
-        </a:xfrm>
-      </p:grpSpPr>
-      <p:sp>
-        <p:nvSpPr>
-          <p:cNvPr id="2" name="Espace réservé de l'image des diapositives 1"/>
-          <p:cNvSpPr>
-            <a:spLocks noGrp="1" noRot="1" noChangeAspect="1"/>
-          </p:cNvSpPr>
-          <p:nvPr>
-            <p:ph type="sldImg"/>
-          </p:nvPr>
-        </p:nvSpPr>
-        <p:spPr/>
-      </p:sp>
-      <p:sp>
-        <p:nvSpPr>
-          <p:cNvPr id="3" name="Espace réservé des commentaires 2"/>
-          <p:cNvSpPr>
-            <a:spLocks noGrp="1"/>
-          </p:cNvSpPr>
-          <p:nvPr>
-            <p:ph type="body" idx="1"/>
-          </p:nvPr>
-        </p:nvSpPr>
-        <p:spPr/>
-        <p:txBody>
-          <a:bodyPr/>
-          <a:lstStyle/>
-          <a:p>
-            <a:endParaRPr lang="fr-FR"/>
-          </a:p>
-        </p:txBody>
-      </p:sp>
-      <p:sp>
-        <p:nvSpPr>
-          <p:cNvPr id="4" name="Espace réservé du numéro de diapositive 3"/>
-          <p:cNvSpPr>
-            <a:spLocks noGrp="1"/>
-          </p:cNvSpPr>
-          <p:nvPr>
-            <p:ph type="sldNum" sz="quarter" idx="10"/>
-          </p:nvPr>
-        </p:nvSpPr>
-        <p:spPr/>
-        <p:txBody>
-          <a:bodyPr/>
-          <a:lstStyle/>
-          <a:p>
-            <a:fld id="{0C080E5F-76A7-426C-8874-1B043B738D2C}" type="slidenum">
-              <a:rPr lang="fr-FR" smtClean="0"/>
-              <a:t>40</a:t>
-            </a:fld>
-            <a:endParaRPr lang="fr-FR"/>
-          </a:p>
-        </p:txBody>
-      </p:sp>
-    </p:spTree>
-    <p:extLst>
-      <p:ext uri="{BB962C8B-B14F-4D97-AF65-F5344CB8AC3E}">
-        <p14:creationId xmlns:p14="http://schemas.microsoft.com/office/powerpoint/2010/main" val="447969412"/>
-      </p:ext>
-    </p:extLst>
-  </p:cSld>
-  <p:clrMapOvr>
-    <a:masterClrMapping/>
-  </p:clrMapOvr>
-</p:notes>
-</file>
-
 <file path=ppt/notesSlides/notesSlide5.xml><?xml version="1.0" encoding="utf-8"?>
 <p:notes xmlns:a="http://schemas.openxmlformats.org/drawingml/2006/main" xmlns:r="http://schemas.openxmlformats.org/officeDocument/2006/relationships" xmlns:p="http://schemas.openxmlformats.org/presentationml/2006/main">
   <p:cSld>
@@ -4070,7 +3985,7 @@
                 </a:solidFill>
               </a:rPr>
               <a:pPr/>
-              <a:t>19/06/2015</a:t>
+              <a:t>20/06/2015</a:t>
             </a:fld>
             <a:endParaRPr lang="fr-FR" b="1" dirty="0">
               <a:solidFill>
@@ -4343,7 +4258,7 @@
           <a:p>
             <a:fld id="{CE5A5207-E07B-4FCF-99F6-F8833A3BB3D7}" type="datetime1">
               <a:rPr lang="fr-FR" smtClean="0"/>
-              <a:t>19/06/2015</a:t>
+              <a:t>20/06/2015</a:t>
             </a:fld>
             <a:endParaRPr lang="fr-FR"/>
           </a:p>
@@ -4523,7 +4438,7 @@
           <a:p>
             <a:fld id="{D68965C6-0898-43EA-9A99-A4039BB22876}" type="datetime1">
               <a:rPr lang="fr-FR" smtClean="0"/>
-              <a:t>19/06/2015</a:t>
+              <a:t>20/06/2015</a:t>
             </a:fld>
             <a:endParaRPr lang="fr-FR"/>
           </a:p>
@@ -4693,7 +4608,7 @@
           <a:p>
             <a:fld id="{94B2F636-2596-4D20-BE75-DC7667EB0908}" type="datetime1">
               <a:rPr lang="fr-FR" smtClean="0"/>
-              <a:t>19/06/2015</a:t>
+              <a:t>20/06/2015</a:t>
             </a:fld>
             <a:endParaRPr lang="fr-FR"/>
           </a:p>
@@ -4939,7 +4854,7 @@
           <a:p>
             <a:fld id="{3941AF55-5B35-49D2-89B7-6A012C2F0023}" type="datetime1">
               <a:rPr lang="fr-FR" smtClean="0"/>
-              <a:t>19/06/2015</a:t>
+              <a:t>20/06/2015</a:t>
             </a:fld>
             <a:endParaRPr lang="fr-FR"/>
           </a:p>
@@ -5227,7 +5142,7 @@
           <a:p>
             <a:fld id="{B36C4D42-2F73-4BB2-8416-8B3A3DDD3EE7}" type="datetime1">
               <a:rPr lang="fr-FR" smtClean="0"/>
-              <a:t>19/06/2015</a:t>
+              <a:t>20/06/2015</a:t>
             </a:fld>
             <a:endParaRPr lang="fr-FR"/>
           </a:p>
@@ -5649,7 +5564,7 @@
           <a:p>
             <a:fld id="{E456F79D-CD5D-4224-B1FA-5F7F3BAA4104}" type="datetime1">
               <a:rPr lang="fr-FR" smtClean="0"/>
-              <a:t>19/06/2015</a:t>
+              <a:t>20/06/2015</a:t>
             </a:fld>
             <a:endParaRPr lang="fr-FR"/>
           </a:p>
@@ -5767,7 +5682,7 @@
           <a:p>
             <a:fld id="{0E910143-4D2C-4FF6-B0A6-06989F9BDBAC}" type="datetime1">
               <a:rPr lang="fr-FR" smtClean="0"/>
-              <a:t>19/06/2015</a:t>
+              <a:t>20/06/2015</a:t>
             </a:fld>
             <a:endParaRPr lang="fr-FR"/>
           </a:p>
@@ -5862,7 +5777,7 @@
           <a:p>
             <a:fld id="{1E0A4A73-C55A-4735-A06F-415E5CC28EBA}" type="datetime1">
               <a:rPr lang="fr-FR" smtClean="0"/>
-              <a:t>19/06/2015</a:t>
+              <a:t>20/06/2015</a:t>
             </a:fld>
             <a:endParaRPr lang="fr-FR"/>
           </a:p>
@@ -6139,7 +6054,7 @@
           <a:p>
             <a:fld id="{B73FC597-E398-43B4-BDF9-08A9085F6959}" type="datetime1">
               <a:rPr lang="fr-FR" smtClean="0"/>
-              <a:t>19/06/2015</a:t>
+              <a:t>20/06/2015</a:t>
             </a:fld>
             <a:endParaRPr lang="fr-FR"/>
           </a:p>
@@ -6392,7 +6307,7 @@
           <a:p>
             <a:fld id="{D6C9D74D-BD35-47D9-98F8-EE91FA02EBB2}" type="datetime1">
               <a:rPr lang="fr-FR" smtClean="0"/>
-              <a:t>19/06/2015</a:t>
+              <a:t>20/06/2015</a:t>
             </a:fld>
             <a:endParaRPr lang="fr-FR"/>
           </a:p>
@@ -6605,7 +6520,7 @@
           <a:p>
             <a:fld id="{C8E6BC2D-0CAC-4C60-B0A8-88D3FE659C6F}" type="datetime1">
               <a:rPr lang="fr-FR" smtClean="0"/>
-              <a:t>19/06/2015</a:t>
+              <a:t>20/06/2015</a:t>
             </a:fld>
             <a:endParaRPr lang="fr-FR"/>
           </a:p>
@@ -9929,15 +9844,7 @@
           <a:p>
             <a:r>
               <a:rPr lang="fr-FR" b="1" dirty="0" smtClean="0"/>
-              <a:t>Utilisez </a:t>
-            </a:r>
-            <a:r>
-              <a:rPr lang="fr-FR" b="1" dirty="0" smtClean="0"/>
-              <a:t>Git Hub </a:t>
-            </a:r>
-            <a:r>
-              <a:rPr lang="fr-FR" b="1" dirty="0" smtClean="0"/>
-              <a:t>pour tous les documents </a:t>
+              <a:t>Utilisez Git Hub pour tous les documents </a:t>
             </a:r>
             <a:endParaRPr lang="fr-FR" dirty="0"/>
           </a:p>
@@ -17807,14 +17714,14 @@
       </p:grpSpPr>
       <p:sp>
         <p:nvSpPr>
-          <p:cNvPr id="6" name="ZoneTexte 5"/>
+          <p:cNvPr id="8" name="ZoneTexte 7"/>
           <p:cNvSpPr txBox="1"/>
           <p:nvPr/>
         </p:nvSpPr>
         <p:spPr>
           <a:xfrm>
-            <a:off x="179512" y="200829"/>
-            <a:ext cx="1656184" cy="369332"/>
+            <a:off x="115476" y="188640"/>
+            <a:ext cx="1000140" cy="369332"/>
           </a:xfrm>
           <a:prstGeom prst="rect">
             <a:avLst/>
@@ -17909,7 +17816,7 @@
           <a:p>
             <a:r>
               <a:rPr lang="fr-FR" dirty="0" smtClean="0"/>
-              <a:t>Installation - 12</a:t>
+              <a:t>Astuce</a:t>
             </a:r>
             <a:endParaRPr lang="fr-FR" dirty="0"/>
           </a:p>
@@ -17918,6 +17825,108 @@
       <p:sp>
         <p:nvSpPr>
           <p:cNvPr id="12" name="Rectangle 11"/>
+          <p:cNvSpPr/>
+          <p:nvPr/>
+        </p:nvSpPr>
+        <p:spPr>
+          <a:xfrm>
+            <a:off x="323528" y="2710661"/>
+            <a:ext cx="6192688" cy="923330"/>
+          </a:xfrm>
+          <a:prstGeom prst="rect">
+            <a:avLst/>
+          </a:prstGeom>
+        </p:spPr>
+        <p:txBody>
+          <a:bodyPr wrap="square">
+            <a:spAutoFit/>
+          </a:bodyPr>
+          <a:lstStyle/>
+          <a:p>
+            <a:r>
+              <a:rPr lang="fr-FR" b="1" dirty="0" smtClean="0"/>
+              <a:t>Accès aux services Windows </a:t>
+            </a:r>
+            <a:r>
+              <a:rPr lang="fr-FR" dirty="0" smtClean="0"/>
+              <a:t>: </a:t>
+            </a:r>
+            <a:endParaRPr lang="fr-FR" dirty="0"/>
+          </a:p>
+          <a:p>
+            <a:r>
+              <a:rPr lang="fr-FR" dirty="0" smtClean="0"/>
+              <a:t>Bouton « </a:t>
+            </a:r>
+            <a:r>
+              <a:rPr lang="fr-FR" b="1" dirty="0" smtClean="0"/>
+              <a:t>Démarrer</a:t>
+            </a:r>
+            <a:r>
+              <a:rPr lang="fr-FR" dirty="0" smtClean="0"/>
+              <a:t> » &gt; Dans la zone de recherche, taper « </a:t>
+            </a:r>
+            <a:r>
+              <a:rPr lang="fr-FR" b="1" dirty="0" err="1" smtClean="0"/>
+              <a:t>services.msc</a:t>
+            </a:r>
+            <a:r>
+              <a:rPr lang="fr-FR" dirty="0" smtClean="0"/>
+              <a:t> »</a:t>
+            </a:r>
+          </a:p>
+        </p:txBody>
+      </p:sp>
+      <p:sp>
+        <p:nvSpPr>
+          <p:cNvPr id="14" name="Rectangle 13"/>
+          <p:cNvSpPr/>
+          <p:nvPr/>
+        </p:nvSpPr>
+        <p:spPr>
+          <a:xfrm>
+            <a:off x="270902" y="4017838"/>
+            <a:ext cx="5165194" cy="923330"/>
+          </a:xfrm>
+          <a:prstGeom prst="rect">
+            <a:avLst/>
+          </a:prstGeom>
+        </p:spPr>
+        <p:txBody>
+          <a:bodyPr wrap="square">
+            <a:spAutoFit/>
+          </a:bodyPr>
+          <a:lstStyle/>
+          <a:p>
+            <a:r>
+              <a:rPr lang="fr-FR" b="1" dirty="0" smtClean="0"/>
+              <a:t>Démarrage des services </a:t>
+            </a:r>
+            <a:r>
+              <a:rPr lang="fr-FR" dirty="0" smtClean="0"/>
+              <a:t>: </a:t>
+            </a:r>
+            <a:endParaRPr lang="fr-FR" dirty="0"/>
+          </a:p>
+          <a:p>
+            <a:r>
+              <a:rPr lang="fr-FR" dirty="0" smtClean="0"/>
+              <a:t>Sur les services de SQL Server arrêtés, cliquer-droit pour le menu contextuel &gt; « </a:t>
+            </a:r>
+            <a:r>
+              <a:rPr lang="fr-FR" b="1" dirty="0" smtClean="0"/>
+              <a:t>Démarrer</a:t>
+            </a:r>
+            <a:r>
+              <a:rPr lang="fr-FR" dirty="0" smtClean="0"/>
+              <a:t> »</a:t>
+            </a:r>
+          </a:p>
+        </p:txBody>
+      </p:sp>
+      <p:sp>
+        <p:nvSpPr>
+          <p:cNvPr id="18" name="Rectangle 17"/>
           <p:cNvSpPr/>
           <p:nvPr/>
         </p:nvSpPr>
@@ -17961,7 +17970,7 @@
       </p:sp>
       <p:sp>
         <p:nvSpPr>
-          <p:cNvPr id="16" name="Rectangle 15"/>
+          <p:cNvPr id="19" name="Rectangle 18"/>
           <p:cNvSpPr/>
           <p:nvPr/>
         </p:nvSpPr>
@@ -18005,7 +18014,7 @@
       </p:sp>
       <p:pic>
         <p:nvPicPr>
-          <p:cNvPr id="7171" name="Picture 3"/>
+          <p:cNvPr id="1027" name="Picture 3"/>
           <p:cNvPicPr>
             <a:picLocks noChangeAspect="1" noChangeArrowheads="1"/>
           </p:cNvPicPr>
@@ -18026,8 +18035,8 @@
         </p:blipFill>
         <p:spPr bwMode="auto">
           <a:xfrm>
-            <a:off x="1395589" y="1980692"/>
-            <a:ext cx="6632795" cy="4616660"/>
+            <a:off x="5436096" y="4221088"/>
+            <a:ext cx="3362325" cy="600075"/>
           </a:xfrm>
           <a:prstGeom prst="rect">
             <a:avLst/>
@@ -18059,14 +18068,14 @@
       </p:pic>
       <p:sp>
         <p:nvSpPr>
-          <p:cNvPr id="9" name="Rectangle 8"/>
+          <p:cNvPr id="13" name="Rectangle 12"/>
           <p:cNvSpPr/>
           <p:nvPr/>
         </p:nvSpPr>
         <p:spPr>
           <a:xfrm>
-            <a:off x="251520" y="764704"/>
-            <a:ext cx="8732350" cy="1200329"/>
+            <a:off x="270902" y="5385990"/>
+            <a:ext cx="8208912" cy="923330"/>
           </a:xfrm>
           <a:prstGeom prst="rect">
             <a:avLst/>
@@ -18079,88 +18088,210 @@
           <a:lstStyle/>
           <a:p>
             <a:r>
-              <a:rPr lang="fr-FR" b="1" dirty="0"/>
-              <a:t>Tester son installation avec </a:t>
-            </a:r>
-            <a:r>
               <a:rPr lang="fr-FR" b="1" dirty="0" smtClean="0"/>
-              <a:t>SSMS</a:t>
-            </a:r>
-            <a:endParaRPr lang="fr-FR" b="1" dirty="0"/>
-          </a:p>
-          <a:p>
-            <a:endParaRPr lang="fr-FR" b="1" dirty="0" smtClean="0"/>
-          </a:p>
-          <a:p>
-            <a:pPr marL="285750" indent="-285750">
-              <a:buFont typeface="Arial" panose="020B0604020202020204" pitchFamily="34" charset="0"/>
-              <a:buChar char="•"/>
+              <a:t>Arrêt des services </a:t>
+            </a:r>
+            <a:r>
+              <a:rPr lang="fr-FR" dirty="0" smtClean="0"/>
+              <a:t>: </a:t>
+            </a:r>
+            <a:endParaRPr lang="fr-FR" dirty="0"/>
+          </a:p>
+          <a:p>
+            <a:r>
+              <a:rPr lang="fr-FR" dirty="0" smtClean="0"/>
+              <a:t>Sur les services de SQL Server démarrés, cliquer-droit pour le menu contextuel &gt; « </a:t>
+            </a:r>
+            <a:r>
+              <a:rPr lang="fr-FR" b="1" dirty="0" smtClean="0"/>
+              <a:t>Arrêter</a:t>
+            </a:r>
+            <a:r>
+              <a:rPr lang="fr-FR" dirty="0" smtClean="0"/>
+              <a:t> »</a:t>
+            </a:r>
+          </a:p>
+        </p:txBody>
+      </p:sp>
+      <p:sp>
+        <p:nvSpPr>
+          <p:cNvPr id="17" name="Rectangle 16"/>
+          <p:cNvSpPr/>
+          <p:nvPr/>
+        </p:nvSpPr>
+        <p:spPr>
+          <a:xfrm>
+            <a:off x="323528" y="799544"/>
+            <a:ext cx="8208912" cy="1477328"/>
+          </a:xfrm>
+          <a:prstGeom prst="rect">
+            <a:avLst/>
+          </a:prstGeom>
+        </p:spPr>
+        <p:txBody>
+          <a:bodyPr wrap="square">
+            <a:spAutoFit/>
+          </a:bodyPr>
+          <a:lstStyle/>
+          <a:p>
+            <a:r>
+              <a:rPr lang="fr-FR" b="1" dirty="0" smtClean="0"/>
+              <a:t>But </a:t>
+            </a:r>
+            <a:r>
+              <a:rPr lang="fr-FR" dirty="0" smtClean="0"/>
+              <a:t>: </a:t>
+            </a:r>
+            <a:endParaRPr lang="fr-FR" dirty="0"/>
+          </a:p>
+          <a:p>
+            <a:r>
+              <a:rPr lang="fr-FR" dirty="0" smtClean="0"/>
+              <a:t>Lors de l’installation, nous avons paramétrés les services de SQL Server en démarrage manuel, afin de ne pas surcharger votre PC en dehors des périodes de développent.</a:t>
+            </a:r>
+          </a:p>
+          <a:p>
+            <a:pPr marL="342900" indent="-342900">
+              <a:buFont typeface="+mj-lt"/>
+              <a:buAutoNum type="arabicPeriod"/>
             </a:pPr>
             <a:r>
-              <a:rPr lang="fr-FR" b="1" dirty="0" smtClean="0"/>
-              <a:t>Sous Windows 7 </a:t>
-            </a:r>
-            <a:r>
-              <a:rPr lang="fr-FR" dirty="0" smtClean="0"/>
-              <a:t>: Bouton « </a:t>
-            </a:r>
-            <a:r>
-              <a:rPr lang="fr-FR" b="1" dirty="0" smtClean="0"/>
-              <a:t>Démarrer</a:t>
-            </a:r>
-            <a:r>
-              <a:rPr lang="fr-FR" dirty="0" smtClean="0"/>
-              <a:t> » &gt; </a:t>
-            </a:r>
-            <a:r>
-              <a:rPr lang="fr-FR" b="1" dirty="0" smtClean="0"/>
-              <a:t>Applications</a:t>
-            </a:r>
-            <a:r>
-              <a:rPr lang="fr-FR" dirty="0" smtClean="0"/>
-              <a:t> &gt; </a:t>
-            </a:r>
-            <a:r>
-              <a:rPr lang="fr-FR" b="1" dirty="0" smtClean="0"/>
-              <a:t>SQL Server 2014 </a:t>
-            </a:r>
-            <a:r>
-              <a:rPr lang="fr-FR" dirty="0" smtClean="0"/>
-              <a:t>&gt; </a:t>
-            </a:r>
-            <a:r>
-              <a:rPr lang="fr-FR" b="1" dirty="0" smtClean="0"/>
-              <a:t>SSMS</a:t>
-            </a:r>
-          </a:p>
-          <a:p>
-            <a:pPr marL="285750" indent="-285750">
-              <a:buFont typeface="Arial" panose="020B0604020202020204" pitchFamily="34" charset="0"/>
-              <a:buChar char="•"/>
+              <a:rPr lang="fr-FR" dirty="0" smtClean="0"/>
+              <a:t>Avant de développer, il faudra démarrer les services associés à SQL Server.</a:t>
+            </a:r>
+          </a:p>
+          <a:p>
+            <a:pPr marL="342900" indent="-342900">
+              <a:buFont typeface="+mj-lt"/>
+              <a:buAutoNum type="arabicPeriod"/>
             </a:pPr>
             <a:r>
-              <a:rPr lang="fr-FR" b="1" dirty="0"/>
-              <a:t>Sous Windows 8 </a:t>
-            </a:r>
-            <a:r>
-              <a:rPr lang="fr-FR" dirty="0"/>
-              <a:t>: </a:t>
-            </a:r>
-            <a:r>
-              <a:rPr lang="fr-FR" dirty="0" smtClean="0"/>
-              <a:t>Lancer la tuile </a:t>
-            </a:r>
-            <a:r>
-              <a:rPr lang="fr-FR" b="1" dirty="0" smtClean="0"/>
-              <a:t>SSMS  </a:t>
-            </a:r>
+              <a:rPr lang="fr-FR" dirty="0" smtClean="0"/>
+              <a:t>En fin de développement, vous pouvez les arrêter.</a:t>
+            </a:r>
+          </a:p>
+        </p:txBody>
+      </p:sp>
+      <p:pic>
+        <p:nvPicPr>
+          <p:cNvPr id="2" name="Image 1"/>
+          <p:cNvPicPr>
+            <a:picLocks noChangeAspect="1"/>
+          </p:cNvPicPr>
+          <p:nvPr/>
+        </p:nvPicPr>
+        <p:blipFill>
+          <a:blip r:embed="rId4"/>
+          <a:stretch>
+            <a:fillRect/>
+          </a:stretch>
+        </p:blipFill>
+        <p:spPr>
+          <a:xfrm>
+            <a:off x="5940152" y="2491288"/>
+            <a:ext cx="2705100" cy="1362075"/>
+          </a:xfrm>
+          <a:prstGeom prst="rect">
+            <a:avLst/>
+          </a:prstGeom>
+        </p:spPr>
+      </p:pic>
+      <p:sp>
+        <p:nvSpPr>
+          <p:cNvPr id="15" name="Rectangle 14"/>
+          <p:cNvSpPr/>
+          <p:nvPr/>
+        </p:nvSpPr>
+        <p:spPr>
+          <a:xfrm>
+            <a:off x="5936771" y="3273747"/>
+            <a:ext cx="2595669" cy="371277"/>
+          </a:xfrm>
+          <a:prstGeom prst="rect">
+            <a:avLst/>
+          </a:prstGeom>
+          <a:noFill/>
+          <a:ln>
+            <a:solidFill>
+              <a:srgbClr val="FF0000"/>
+            </a:solidFill>
+          </a:ln>
+        </p:spPr>
+        <p:style>
+          <a:lnRef idx="2">
+            <a:schemeClr val="accent1">
+              <a:shade val="50000"/>
+            </a:schemeClr>
+          </a:lnRef>
+          <a:fillRef idx="1">
+            <a:schemeClr val="accent1"/>
+          </a:fillRef>
+          <a:effectRef idx="0">
+            <a:schemeClr val="accent1"/>
+          </a:effectRef>
+          <a:fontRef idx="minor">
+            <a:schemeClr val="lt1"/>
+          </a:fontRef>
+        </p:style>
+        <p:txBody>
+          <a:bodyPr rtlCol="0" anchor="ctr"/>
+          <a:lstStyle/>
+          <a:p>
+            <a:pPr algn="ctr"/>
+            <a:endParaRPr lang="fr-FR"/>
+          </a:p>
+        </p:txBody>
+      </p:sp>
+      <p:sp>
+        <p:nvSpPr>
+          <p:cNvPr id="16" name="Rectangle 15"/>
+          <p:cNvSpPr/>
+          <p:nvPr/>
+        </p:nvSpPr>
+        <p:spPr>
+          <a:xfrm>
+            <a:off x="5936771" y="2480122"/>
+            <a:ext cx="2595669" cy="600075"/>
+          </a:xfrm>
+          <a:prstGeom prst="rect">
+            <a:avLst/>
+          </a:prstGeom>
+          <a:noFill/>
+          <a:ln>
+            <a:solidFill>
+              <a:srgbClr val="FF0000"/>
+            </a:solidFill>
+          </a:ln>
+        </p:spPr>
+        <p:style>
+          <a:lnRef idx="2">
+            <a:schemeClr val="accent1">
+              <a:shade val="50000"/>
+            </a:schemeClr>
+          </a:lnRef>
+          <a:fillRef idx="1">
+            <a:schemeClr val="accent1"/>
+          </a:fillRef>
+          <a:effectRef idx="0">
+            <a:schemeClr val="accent1"/>
+          </a:effectRef>
+          <a:fontRef idx="minor">
+            <a:schemeClr val="lt1"/>
+          </a:fontRef>
+        </p:style>
+        <p:txBody>
+          <a:bodyPr rtlCol="0" anchor="ctr"/>
+          <a:lstStyle/>
+          <a:p>
+            <a:pPr algn="ctr"/>
+            <a:endParaRPr lang="fr-FR"/>
           </a:p>
         </p:txBody>
       </p:sp>
     </p:spTree>
     <p:extLst>
       <p:ext uri="{BB962C8B-B14F-4D97-AF65-F5344CB8AC3E}">
-        <p14:creationId xmlns:p14="http://schemas.microsoft.com/office/powerpoint/2010/main" val="3444440392"/>
+        <p14:creationId xmlns:p14="http://schemas.microsoft.com/office/powerpoint/2010/main" val="1924415414"/>
       </p:ext>
     </p:extLst>
   </p:cSld>
@@ -18298,7 +18429,7 @@
           <a:p>
             <a:r>
               <a:rPr lang="fr-FR" dirty="0" smtClean="0"/>
-              <a:t>Installation - 13</a:t>
+              <a:t>Installation - 12</a:t>
             </a:r>
             <a:endParaRPr lang="fr-FR" dirty="0"/>
           </a:p>
@@ -18392,308 +18523,9 @@
           </a:p>
         </p:txBody>
       </p:sp>
-      <p:sp>
-        <p:nvSpPr>
-          <p:cNvPr id="9" name="Rectangle 8"/>
-          <p:cNvSpPr/>
-          <p:nvPr/>
-        </p:nvSpPr>
-        <p:spPr>
-          <a:xfrm>
-            <a:off x="251520" y="911746"/>
-            <a:ext cx="4032448" cy="2654573"/>
-          </a:xfrm>
-          <a:prstGeom prst="rect">
-            <a:avLst/>
-          </a:prstGeom>
-        </p:spPr>
-        <p:txBody>
-          <a:bodyPr wrap="square">
-            <a:spAutoFit/>
-          </a:bodyPr>
-          <a:lstStyle/>
-          <a:p>
-            <a:r>
-              <a:rPr lang="fr-FR" b="1" dirty="0" smtClean="0"/>
-              <a:t>Ecran de connexion SSMS</a:t>
-            </a:r>
-            <a:endParaRPr lang="fr-FR" b="1" dirty="0"/>
-          </a:p>
-          <a:p>
-            <a:pPr>
-              <a:spcBef>
-                <a:spcPts val="300"/>
-              </a:spcBef>
-              <a:spcAft>
-                <a:spcPts val="300"/>
-              </a:spcAft>
-            </a:pPr>
-            <a:endParaRPr lang="fr-FR" b="1" dirty="0" smtClean="0"/>
-          </a:p>
-          <a:p>
-            <a:pPr>
-              <a:spcBef>
-                <a:spcPts val="300"/>
-              </a:spcBef>
-              <a:spcAft>
-                <a:spcPts val="300"/>
-              </a:spcAft>
-            </a:pPr>
-            <a:r>
-              <a:rPr lang="fr-FR" b="1" dirty="0" smtClean="0"/>
-              <a:t>Pour tester la base SQL Server :</a:t>
-            </a:r>
-          </a:p>
-          <a:p>
-            <a:pPr marL="285750" indent="-285750">
-              <a:spcBef>
-                <a:spcPts val="300"/>
-              </a:spcBef>
-              <a:spcAft>
-                <a:spcPts val="300"/>
-              </a:spcAft>
-              <a:buFont typeface="Arial" panose="020B0604020202020204" pitchFamily="34" charset="0"/>
-              <a:buChar char="•"/>
-            </a:pPr>
-            <a:r>
-              <a:rPr lang="fr-FR" b="1" dirty="0" smtClean="0"/>
-              <a:t>Server type : </a:t>
-            </a:r>
-            <a:r>
-              <a:rPr lang="fr-FR" dirty="0" smtClean="0"/>
-              <a:t>« </a:t>
-            </a:r>
-            <a:r>
-              <a:rPr lang="fr-FR" dirty="0" err="1" smtClean="0"/>
-              <a:t>Database</a:t>
-            </a:r>
-            <a:r>
-              <a:rPr lang="fr-FR" dirty="0" smtClean="0"/>
-              <a:t> </a:t>
-            </a:r>
-            <a:r>
-              <a:rPr lang="fr-FR" dirty="0" err="1" smtClean="0"/>
-              <a:t>engine</a:t>
-            </a:r>
-            <a:r>
-              <a:rPr lang="fr-FR" dirty="0" smtClean="0"/>
-              <a:t> »</a:t>
-            </a:r>
-          </a:p>
-          <a:p>
-            <a:pPr marL="285750" indent="-285750">
-              <a:spcBef>
-                <a:spcPts val="300"/>
-              </a:spcBef>
-              <a:spcAft>
-                <a:spcPts val="300"/>
-              </a:spcAft>
-              <a:buFont typeface="Arial" panose="020B0604020202020204" pitchFamily="34" charset="0"/>
-              <a:buChar char="•"/>
-            </a:pPr>
-            <a:r>
-              <a:rPr lang="fr-FR" b="1" dirty="0" smtClean="0"/>
-              <a:t>Server </a:t>
-            </a:r>
-            <a:r>
-              <a:rPr lang="fr-FR" b="1" dirty="0" err="1" smtClean="0"/>
-              <a:t>name</a:t>
-            </a:r>
-            <a:r>
-              <a:rPr lang="fr-FR" b="1" dirty="0" smtClean="0"/>
-              <a:t> </a:t>
-            </a:r>
-            <a:r>
-              <a:rPr lang="fr-FR" dirty="0" smtClean="0"/>
-              <a:t>: Nom de votre PC</a:t>
-            </a:r>
-          </a:p>
-          <a:p>
-            <a:pPr marL="285750" indent="-285750">
-              <a:spcBef>
-                <a:spcPts val="300"/>
-              </a:spcBef>
-              <a:spcAft>
-                <a:spcPts val="300"/>
-              </a:spcAft>
-              <a:buFont typeface="Arial" panose="020B0604020202020204" pitchFamily="34" charset="0"/>
-              <a:buChar char="•"/>
-            </a:pPr>
-            <a:r>
-              <a:rPr lang="fr-FR" b="1" dirty="0" err="1" smtClean="0"/>
-              <a:t>Authentication</a:t>
-            </a:r>
-            <a:r>
-              <a:rPr lang="fr-FR" b="1" dirty="0" smtClean="0"/>
-              <a:t> </a:t>
-            </a:r>
-            <a:r>
-              <a:rPr lang="fr-FR" dirty="0" smtClean="0"/>
-              <a:t>: </a:t>
-            </a:r>
-            <a:r>
-              <a:rPr lang="fr-FR" dirty="0"/>
-              <a:t>User </a:t>
-            </a:r>
-            <a:r>
-              <a:rPr lang="fr-FR" dirty="0" err="1"/>
-              <a:t>name</a:t>
-            </a:r>
-            <a:r>
-              <a:rPr lang="fr-FR" dirty="0"/>
-              <a:t> et </a:t>
-            </a:r>
-            <a:r>
-              <a:rPr lang="fr-FR" dirty="0" err="1"/>
-              <a:t>passwords</a:t>
-            </a:r>
-            <a:r>
-              <a:rPr lang="fr-FR" dirty="0"/>
-              <a:t> définis lors de l’installation de la base </a:t>
-            </a:r>
-            <a:r>
-              <a:rPr lang="fr-FR" dirty="0" smtClean="0"/>
-              <a:t>SQL Server.</a:t>
-            </a:r>
-            <a:endParaRPr lang="fr-FR" dirty="0"/>
-          </a:p>
-        </p:txBody>
-      </p:sp>
-      <p:sp>
-        <p:nvSpPr>
-          <p:cNvPr id="8" name="Rectangle 7"/>
-          <p:cNvSpPr/>
-          <p:nvPr/>
-        </p:nvSpPr>
-        <p:spPr>
-          <a:xfrm>
-            <a:off x="265222" y="3798039"/>
-            <a:ext cx="4032448" cy="1985159"/>
-          </a:xfrm>
-          <a:prstGeom prst="rect">
-            <a:avLst/>
-          </a:prstGeom>
-        </p:spPr>
-        <p:txBody>
-          <a:bodyPr wrap="square">
-            <a:spAutoFit/>
-          </a:bodyPr>
-          <a:lstStyle/>
-          <a:p>
-            <a:pPr>
-              <a:spcBef>
-                <a:spcPts val="300"/>
-              </a:spcBef>
-              <a:spcAft>
-                <a:spcPts val="300"/>
-              </a:spcAft>
-            </a:pPr>
-            <a:r>
-              <a:rPr lang="fr-FR" b="1" dirty="0" smtClean="0"/>
-              <a:t>Pour tester la base OLAP – SSAS :</a:t>
-            </a:r>
-          </a:p>
-          <a:p>
-            <a:pPr marL="285750" indent="-285750">
-              <a:spcBef>
-                <a:spcPts val="300"/>
-              </a:spcBef>
-              <a:spcAft>
-                <a:spcPts val="300"/>
-              </a:spcAft>
-              <a:buFont typeface="Arial" panose="020B0604020202020204" pitchFamily="34" charset="0"/>
-              <a:buChar char="•"/>
-            </a:pPr>
-            <a:r>
-              <a:rPr lang="fr-FR" b="1" dirty="0" smtClean="0"/>
-              <a:t>Server type : </a:t>
-            </a:r>
-            <a:r>
-              <a:rPr lang="fr-FR" dirty="0" smtClean="0"/>
-              <a:t>« SSAS »</a:t>
-            </a:r>
-          </a:p>
-          <a:p>
-            <a:pPr marL="285750" indent="-285750">
-              <a:spcBef>
-                <a:spcPts val="300"/>
-              </a:spcBef>
-              <a:spcAft>
-                <a:spcPts val="300"/>
-              </a:spcAft>
-              <a:buFont typeface="Arial" panose="020B0604020202020204" pitchFamily="34" charset="0"/>
-              <a:buChar char="•"/>
-            </a:pPr>
-            <a:r>
-              <a:rPr lang="fr-FR" b="1" dirty="0" smtClean="0"/>
-              <a:t>Server </a:t>
-            </a:r>
-            <a:r>
-              <a:rPr lang="fr-FR" b="1" dirty="0" err="1" smtClean="0"/>
-              <a:t>name</a:t>
-            </a:r>
-            <a:r>
-              <a:rPr lang="fr-FR" b="1" dirty="0" smtClean="0"/>
-              <a:t> </a:t>
-            </a:r>
-            <a:r>
-              <a:rPr lang="fr-FR" dirty="0"/>
-              <a:t>: Nom de votre </a:t>
-            </a:r>
-            <a:r>
-              <a:rPr lang="fr-FR" dirty="0" smtClean="0"/>
-              <a:t>PC</a:t>
-            </a:r>
-          </a:p>
-          <a:p>
-            <a:pPr marL="285750" indent="-285750">
-              <a:spcBef>
-                <a:spcPts val="300"/>
-              </a:spcBef>
-              <a:spcAft>
-                <a:spcPts val="300"/>
-              </a:spcAft>
-              <a:buFont typeface="Arial" panose="020B0604020202020204" pitchFamily="34" charset="0"/>
-              <a:buChar char="•"/>
-            </a:pPr>
-            <a:r>
-              <a:rPr lang="fr-FR" b="1" dirty="0" err="1" smtClean="0"/>
-              <a:t>Authentication</a:t>
-            </a:r>
-            <a:r>
-              <a:rPr lang="fr-FR" b="1" dirty="0" smtClean="0"/>
-              <a:t> </a:t>
-            </a:r>
-            <a:r>
-              <a:rPr lang="fr-FR" dirty="0"/>
-              <a:t> </a:t>
-            </a:r>
-            <a:r>
-              <a:rPr lang="fr-FR" dirty="0" smtClean="0"/>
-              <a:t>: User </a:t>
-            </a:r>
-            <a:r>
-              <a:rPr lang="fr-FR" dirty="0" err="1" smtClean="0"/>
-              <a:t>name</a:t>
-            </a:r>
-            <a:r>
-              <a:rPr lang="fr-FR" dirty="0" smtClean="0"/>
-              <a:t> et </a:t>
-            </a:r>
-            <a:r>
-              <a:rPr lang="fr-FR" dirty="0" err="1" smtClean="0"/>
-              <a:t>passwords</a:t>
-            </a:r>
-            <a:r>
-              <a:rPr lang="fr-FR" dirty="0" smtClean="0"/>
-              <a:t> définis lors de l’installation de la base OLAP.</a:t>
-            </a:r>
-          </a:p>
-        </p:txBody>
-      </p:sp>
       <p:pic>
         <p:nvPicPr>
-          <p:cNvPr id="5122" name="Picture 2"/>
+          <p:cNvPr id="7171" name="Picture 3"/>
           <p:cNvPicPr>
             <a:picLocks noChangeAspect="1" noChangeArrowheads="1"/>
           </p:cNvPicPr>
@@ -18714,8 +18546,8 @@
         </p:blipFill>
         <p:spPr bwMode="auto">
           <a:xfrm>
-            <a:off x="4818856" y="1268760"/>
-            <a:ext cx="4114800" cy="3105150"/>
+            <a:off x="2195736" y="2537622"/>
+            <a:ext cx="5832648" cy="4059729"/>
           </a:xfrm>
           <a:prstGeom prst="rect">
             <a:avLst/>
@@ -18724,7 +18556,6 @@
           <a:ln>
             <a:noFill/>
           </a:ln>
-          <a:effectLst/>
           <a:extLst>
             <a:ext uri="{909E8E84-426E-40DD-AFC4-6F175D3DCCD1}">
               <a14:hiddenFill xmlns:a14="http://schemas.microsoft.com/office/drawing/2010/main">
@@ -18743,14 +18574,155 @@
                 <a:tailEnd/>
               </a14:hiddenLine>
             </a:ext>
-            <a:ext uri="{AF507438-7753-43E0-B8FC-AC1667EBCBE1}">
-              <a14:hiddenEffects xmlns:a14="http://schemas.microsoft.com/office/drawing/2010/main">
-                <a:effectLst>
-                  <a:outerShdw dist="35921" dir="2700000" algn="ctr" rotWithShape="0">
-                    <a:schemeClr val="bg2"/>
-                  </a:outerShdw>
-                </a:effectLst>
-              </a14:hiddenEffects>
+          </a:extLst>
+        </p:spPr>
+      </p:pic>
+      <p:sp>
+        <p:nvSpPr>
+          <p:cNvPr id="9" name="Rectangle 8"/>
+          <p:cNvSpPr/>
+          <p:nvPr/>
+        </p:nvSpPr>
+        <p:spPr>
+          <a:xfrm>
+            <a:off x="251520" y="764704"/>
+            <a:ext cx="8732350" cy="1754326"/>
+          </a:xfrm>
+          <a:prstGeom prst="rect">
+            <a:avLst/>
+          </a:prstGeom>
+        </p:spPr>
+        <p:txBody>
+          <a:bodyPr wrap="square">
+            <a:spAutoFit/>
+          </a:bodyPr>
+          <a:lstStyle/>
+          <a:p>
+            <a:r>
+              <a:rPr lang="fr-FR" b="1" dirty="0"/>
+              <a:t>Tester son installation avec </a:t>
+            </a:r>
+            <a:r>
+              <a:rPr lang="fr-FR" b="1" dirty="0" smtClean="0"/>
+              <a:t>SSMS :</a:t>
+            </a:r>
+          </a:p>
+          <a:p>
+            <a:endParaRPr lang="fr-FR" b="1" dirty="0"/>
+          </a:p>
+          <a:p>
+            <a:r>
+              <a:rPr lang="fr-FR" dirty="0" smtClean="0"/>
+              <a:t>         Vérifier que les services de SQL Server soient démarrés.</a:t>
+            </a:r>
+            <a:endParaRPr lang="fr-FR" dirty="0"/>
+          </a:p>
+          <a:p>
+            <a:endParaRPr lang="fr-FR" b="1" dirty="0" smtClean="0"/>
+          </a:p>
+          <a:p>
+            <a:pPr marL="285750" indent="-285750">
+              <a:buFont typeface="Arial" panose="020B0604020202020204" pitchFamily="34" charset="0"/>
+              <a:buChar char="•"/>
+            </a:pPr>
+            <a:r>
+              <a:rPr lang="fr-FR" b="1" dirty="0" smtClean="0"/>
+              <a:t>Sous Windows 7 </a:t>
+            </a:r>
+            <a:r>
+              <a:rPr lang="fr-FR" dirty="0" smtClean="0"/>
+              <a:t>: Bouton « </a:t>
+            </a:r>
+            <a:r>
+              <a:rPr lang="fr-FR" b="1" dirty="0" smtClean="0"/>
+              <a:t>Démarrer</a:t>
+            </a:r>
+            <a:r>
+              <a:rPr lang="fr-FR" dirty="0" smtClean="0"/>
+              <a:t> » &gt; </a:t>
+            </a:r>
+            <a:r>
+              <a:rPr lang="fr-FR" b="1" dirty="0" smtClean="0"/>
+              <a:t>Applications</a:t>
+            </a:r>
+            <a:r>
+              <a:rPr lang="fr-FR" dirty="0" smtClean="0"/>
+              <a:t> &gt; </a:t>
+            </a:r>
+            <a:r>
+              <a:rPr lang="fr-FR" b="1" dirty="0" smtClean="0"/>
+              <a:t>SQL Server 2014 </a:t>
+            </a:r>
+            <a:r>
+              <a:rPr lang="fr-FR" dirty="0" smtClean="0"/>
+              <a:t>&gt; </a:t>
+            </a:r>
+            <a:r>
+              <a:rPr lang="fr-FR" b="1" dirty="0" smtClean="0"/>
+              <a:t>SSMS</a:t>
+            </a:r>
+          </a:p>
+          <a:p>
+            <a:pPr marL="285750" indent="-285750">
+              <a:buFont typeface="Arial" panose="020B0604020202020204" pitchFamily="34" charset="0"/>
+              <a:buChar char="•"/>
+            </a:pPr>
+            <a:r>
+              <a:rPr lang="fr-FR" b="1" dirty="0"/>
+              <a:t>Sous Windows 8 </a:t>
+            </a:r>
+            <a:r>
+              <a:rPr lang="fr-FR" dirty="0"/>
+              <a:t>: </a:t>
+            </a:r>
+            <a:r>
+              <a:rPr lang="fr-FR" dirty="0" smtClean="0"/>
+              <a:t>Lancer la tuile </a:t>
+            </a:r>
+            <a:r>
+              <a:rPr lang="fr-FR" b="1" dirty="0" smtClean="0"/>
+              <a:t>SSMS  </a:t>
+            </a:r>
+          </a:p>
+        </p:txBody>
+      </p:sp>
+      <p:pic>
+        <p:nvPicPr>
+          <p:cNvPr id="1026" name="Picture 2" descr="http://www.adhd-app.com/wp-content/uploads/2013/02/attention.png"/>
+          <p:cNvPicPr>
+            <a:picLocks noChangeAspect="1" noChangeArrowheads="1"/>
+          </p:cNvPicPr>
+          <p:nvPr/>
+        </p:nvPicPr>
+        <p:blipFill>
+          <a:blip r:embed="rId4" cstate="print">
+            <a:extLst>
+              <a:ext uri="{28A0092B-C50C-407E-A947-70E740481C1C}">
+                <a14:useLocalDpi xmlns:a14="http://schemas.microsoft.com/office/drawing/2010/main" val="0"/>
+              </a:ext>
+            </a:extLst>
+          </a:blip>
+          <a:srcRect/>
+          <a:stretch>
+            <a:fillRect/>
+          </a:stretch>
+        </p:blipFill>
+        <p:spPr bwMode="auto">
+          <a:xfrm>
+            <a:off x="163014" y="1268760"/>
+            <a:ext cx="565807" cy="490555"/>
+          </a:xfrm>
+          <a:prstGeom prst="rect">
+            <a:avLst/>
+          </a:prstGeom>
+          <a:noFill/>
+          <a:extLst>
+            <a:ext uri="{909E8E84-426E-40DD-AFC4-6F175D3DCCD1}">
+              <a14:hiddenFill xmlns:a14="http://schemas.microsoft.com/office/drawing/2010/main">
+                <a:solidFill>
+                  <a:srgbClr val="FFFFFF"/>
+                </a:solidFill>
+              </a14:hiddenFill>
             </a:ext>
           </a:extLst>
         </p:spPr>
@@ -18758,7 +18730,7 @@
     </p:spTree>
     <p:extLst>
       <p:ext uri="{BB962C8B-B14F-4D97-AF65-F5344CB8AC3E}">
-        <p14:creationId xmlns:p14="http://schemas.microsoft.com/office/powerpoint/2010/main" val="308545997"/>
+        <p14:creationId xmlns:p14="http://schemas.microsoft.com/office/powerpoint/2010/main" val="3444440392"/>
       </p:ext>
     </p:extLst>
   </p:cSld>
@@ -18794,14 +18766,14 @@
       </p:grpSpPr>
       <p:sp>
         <p:nvSpPr>
-          <p:cNvPr id="8" name="ZoneTexte 7"/>
+          <p:cNvPr id="6" name="ZoneTexte 5"/>
           <p:cNvSpPr txBox="1"/>
           <p:nvPr/>
         </p:nvSpPr>
         <p:spPr>
           <a:xfrm>
-            <a:off x="115476" y="188640"/>
-            <a:ext cx="1000140" cy="369332"/>
+            <a:off x="179512" y="200829"/>
+            <a:ext cx="1656184" cy="369332"/>
           </a:xfrm>
           <a:prstGeom prst="rect">
             <a:avLst/>
@@ -18896,7 +18868,7 @@
           <a:p>
             <a:r>
               <a:rPr lang="fr-FR" dirty="0" smtClean="0"/>
-              <a:t>Astuce</a:t>
+              <a:t>Installation - 13</a:t>
             </a:r>
             <a:endParaRPr lang="fr-FR" dirty="0"/>
           </a:p>
@@ -18905,108 +18877,6 @@
       <p:sp>
         <p:nvSpPr>
           <p:cNvPr id="12" name="Rectangle 11"/>
-          <p:cNvSpPr/>
-          <p:nvPr/>
-        </p:nvSpPr>
-        <p:spPr>
-          <a:xfrm>
-            <a:off x="323528" y="2710661"/>
-            <a:ext cx="6192688" cy="923330"/>
-          </a:xfrm>
-          <a:prstGeom prst="rect">
-            <a:avLst/>
-          </a:prstGeom>
-        </p:spPr>
-        <p:txBody>
-          <a:bodyPr wrap="square">
-            <a:spAutoFit/>
-          </a:bodyPr>
-          <a:lstStyle/>
-          <a:p>
-            <a:r>
-              <a:rPr lang="fr-FR" b="1" dirty="0" smtClean="0"/>
-              <a:t>Accès aux services Windows </a:t>
-            </a:r>
-            <a:r>
-              <a:rPr lang="fr-FR" dirty="0" smtClean="0"/>
-              <a:t>: </a:t>
-            </a:r>
-            <a:endParaRPr lang="fr-FR" dirty="0"/>
-          </a:p>
-          <a:p>
-            <a:r>
-              <a:rPr lang="fr-FR" dirty="0" smtClean="0"/>
-              <a:t>Bouton « </a:t>
-            </a:r>
-            <a:r>
-              <a:rPr lang="fr-FR" b="1" dirty="0" smtClean="0"/>
-              <a:t>Démarrer</a:t>
-            </a:r>
-            <a:r>
-              <a:rPr lang="fr-FR" dirty="0" smtClean="0"/>
-              <a:t> » &gt; Dans la zone de recherche, taper « </a:t>
-            </a:r>
-            <a:r>
-              <a:rPr lang="fr-FR" b="1" dirty="0" err="1" smtClean="0"/>
-              <a:t>services.msc</a:t>
-            </a:r>
-            <a:r>
-              <a:rPr lang="fr-FR" dirty="0" smtClean="0"/>
-              <a:t> »</a:t>
-            </a:r>
-          </a:p>
-        </p:txBody>
-      </p:sp>
-      <p:sp>
-        <p:nvSpPr>
-          <p:cNvPr id="14" name="Rectangle 13"/>
-          <p:cNvSpPr/>
-          <p:nvPr/>
-        </p:nvSpPr>
-        <p:spPr>
-          <a:xfrm>
-            <a:off x="270902" y="4017838"/>
-            <a:ext cx="5165194" cy="923330"/>
-          </a:xfrm>
-          <a:prstGeom prst="rect">
-            <a:avLst/>
-          </a:prstGeom>
-        </p:spPr>
-        <p:txBody>
-          <a:bodyPr wrap="square">
-            <a:spAutoFit/>
-          </a:bodyPr>
-          <a:lstStyle/>
-          <a:p>
-            <a:r>
-              <a:rPr lang="fr-FR" b="1" dirty="0" smtClean="0"/>
-              <a:t>Démarrage des services </a:t>
-            </a:r>
-            <a:r>
-              <a:rPr lang="fr-FR" dirty="0" smtClean="0"/>
-              <a:t>: </a:t>
-            </a:r>
-            <a:endParaRPr lang="fr-FR" dirty="0"/>
-          </a:p>
-          <a:p>
-            <a:r>
-              <a:rPr lang="fr-FR" dirty="0" smtClean="0"/>
-              <a:t>Sur les services de SQL Server arrêtés, cliquer-droit pour le menu contextuel &gt; « </a:t>
-            </a:r>
-            <a:r>
-              <a:rPr lang="fr-FR" b="1" dirty="0" smtClean="0"/>
-              <a:t>Démarrer</a:t>
-            </a:r>
-            <a:r>
-              <a:rPr lang="fr-FR" dirty="0" smtClean="0"/>
-              <a:t> »</a:t>
-            </a:r>
-          </a:p>
-        </p:txBody>
-      </p:sp>
-      <p:sp>
-        <p:nvSpPr>
-          <p:cNvPr id="18" name="Rectangle 17"/>
           <p:cNvSpPr/>
           <p:nvPr/>
         </p:nvSpPr>
@@ -19050,7 +18920,7 @@
       </p:sp>
       <p:sp>
         <p:nvSpPr>
-          <p:cNvPr id="19" name="Rectangle 18"/>
+          <p:cNvPr id="16" name="Rectangle 15"/>
           <p:cNvSpPr/>
           <p:nvPr/>
         </p:nvSpPr>
@@ -19092,224 +18962,344 @@
           </a:p>
         </p:txBody>
       </p:sp>
+      <p:sp>
+        <p:nvSpPr>
+          <p:cNvPr id="9" name="Rectangle 8"/>
+          <p:cNvSpPr/>
+          <p:nvPr/>
+        </p:nvSpPr>
+        <p:spPr>
+          <a:xfrm>
+            <a:off x="251520" y="911746"/>
+            <a:ext cx="4608512" cy="2377574"/>
+          </a:xfrm>
+          <a:prstGeom prst="rect">
+            <a:avLst/>
+          </a:prstGeom>
+        </p:spPr>
+        <p:txBody>
+          <a:bodyPr wrap="square">
+            <a:spAutoFit/>
+          </a:bodyPr>
+          <a:lstStyle/>
+          <a:p>
+            <a:r>
+              <a:rPr lang="fr-FR" b="1" dirty="0" smtClean="0"/>
+              <a:t>Ecran de connexion SSMS</a:t>
+            </a:r>
+            <a:endParaRPr lang="fr-FR" b="1" dirty="0"/>
+          </a:p>
+          <a:p>
+            <a:pPr>
+              <a:spcBef>
+                <a:spcPts val="300"/>
+              </a:spcBef>
+              <a:spcAft>
+                <a:spcPts val="300"/>
+              </a:spcAft>
+            </a:pPr>
+            <a:endParaRPr lang="fr-FR" b="1" dirty="0" smtClean="0"/>
+          </a:p>
+          <a:p>
+            <a:pPr>
+              <a:spcBef>
+                <a:spcPts val="300"/>
+              </a:spcBef>
+              <a:spcAft>
+                <a:spcPts val="300"/>
+              </a:spcAft>
+            </a:pPr>
+            <a:r>
+              <a:rPr lang="fr-FR" b="1" dirty="0" smtClean="0"/>
+              <a:t>Pour tester la base SQL Server :</a:t>
+            </a:r>
+          </a:p>
+          <a:p>
+            <a:pPr marL="285750" indent="-285750">
+              <a:spcBef>
+                <a:spcPts val="300"/>
+              </a:spcBef>
+              <a:spcAft>
+                <a:spcPts val="300"/>
+              </a:spcAft>
+              <a:buFont typeface="Arial" panose="020B0604020202020204" pitchFamily="34" charset="0"/>
+              <a:buChar char="•"/>
+            </a:pPr>
+            <a:r>
+              <a:rPr lang="fr-FR" b="1" dirty="0" smtClean="0"/>
+              <a:t>Server type : </a:t>
+            </a:r>
+            <a:r>
+              <a:rPr lang="fr-FR" dirty="0" smtClean="0"/>
+              <a:t>« </a:t>
+            </a:r>
+            <a:r>
+              <a:rPr lang="fr-FR" dirty="0" err="1" smtClean="0"/>
+              <a:t>Database</a:t>
+            </a:r>
+            <a:r>
+              <a:rPr lang="fr-FR" dirty="0" smtClean="0"/>
+              <a:t> </a:t>
+            </a:r>
+            <a:r>
+              <a:rPr lang="fr-FR" dirty="0" err="1" smtClean="0"/>
+              <a:t>engine</a:t>
+            </a:r>
+            <a:r>
+              <a:rPr lang="fr-FR" dirty="0" smtClean="0"/>
+              <a:t> »</a:t>
+            </a:r>
+          </a:p>
+          <a:p>
+            <a:pPr marL="285750" indent="-285750">
+              <a:spcBef>
+                <a:spcPts val="300"/>
+              </a:spcBef>
+              <a:spcAft>
+                <a:spcPts val="300"/>
+              </a:spcAft>
+              <a:buFont typeface="Arial" panose="020B0604020202020204" pitchFamily="34" charset="0"/>
+              <a:buChar char="•"/>
+            </a:pPr>
+            <a:r>
+              <a:rPr lang="fr-FR" b="1" dirty="0" smtClean="0"/>
+              <a:t>Server </a:t>
+            </a:r>
+            <a:r>
+              <a:rPr lang="fr-FR" b="1" dirty="0" err="1" smtClean="0"/>
+              <a:t>name</a:t>
+            </a:r>
+            <a:r>
+              <a:rPr lang="fr-FR" b="1" dirty="0" smtClean="0"/>
+              <a:t> </a:t>
+            </a:r>
+            <a:r>
+              <a:rPr lang="fr-FR" dirty="0" smtClean="0"/>
+              <a:t>: Nom de votre PC</a:t>
+            </a:r>
+          </a:p>
+          <a:p>
+            <a:pPr marL="285750" indent="-285750">
+              <a:spcBef>
+                <a:spcPts val="300"/>
+              </a:spcBef>
+              <a:spcAft>
+                <a:spcPts val="300"/>
+              </a:spcAft>
+              <a:buFont typeface="Arial" panose="020B0604020202020204" pitchFamily="34" charset="0"/>
+              <a:buChar char="•"/>
+            </a:pPr>
+            <a:r>
+              <a:rPr lang="fr-FR" b="1" dirty="0" err="1" smtClean="0"/>
+              <a:t>Authentication</a:t>
+            </a:r>
+            <a:r>
+              <a:rPr lang="fr-FR" b="1" dirty="0" smtClean="0"/>
+              <a:t> </a:t>
+            </a:r>
+            <a:r>
+              <a:rPr lang="fr-FR" dirty="0" smtClean="0"/>
+              <a:t>: </a:t>
+            </a:r>
+            <a:r>
+              <a:rPr lang="fr-FR" dirty="0"/>
+              <a:t>« Windows </a:t>
+            </a:r>
+            <a:r>
+              <a:rPr lang="fr-FR" dirty="0" err="1"/>
+              <a:t>authentication</a:t>
+            </a:r>
+            <a:r>
+              <a:rPr lang="fr-FR" dirty="0"/>
+              <a:t> »</a:t>
+            </a:r>
+          </a:p>
+        </p:txBody>
+      </p:sp>
+      <p:sp>
+        <p:nvSpPr>
+          <p:cNvPr id="8" name="Rectangle 7"/>
+          <p:cNvSpPr/>
+          <p:nvPr/>
+        </p:nvSpPr>
+        <p:spPr>
+          <a:xfrm>
+            <a:off x="265222" y="4241120"/>
+            <a:ext cx="4032448" cy="1708160"/>
+          </a:xfrm>
+          <a:prstGeom prst="rect">
+            <a:avLst/>
+          </a:prstGeom>
+        </p:spPr>
+        <p:txBody>
+          <a:bodyPr wrap="square">
+            <a:spAutoFit/>
+          </a:bodyPr>
+          <a:lstStyle/>
+          <a:p>
+            <a:pPr>
+              <a:spcBef>
+                <a:spcPts val="300"/>
+              </a:spcBef>
+              <a:spcAft>
+                <a:spcPts val="300"/>
+              </a:spcAft>
+            </a:pPr>
+            <a:r>
+              <a:rPr lang="fr-FR" b="1" dirty="0" smtClean="0"/>
+              <a:t>Pour tester la base OLAP – SSAS :</a:t>
+            </a:r>
+          </a:p>
+          <a:p>
+            <a:pPr marL="285750" indent="-285750">
+              <a:spcBef>
+                <a:spcPts val="300"/>
+              </a:spcBef>
+              <a:spcAft>
+                <a:spcPts val="300"/>
+              </a:spcAft>
+              <a:buFont typeface="Arial" panose="020B0604020202020204" pitchFamily="34" charset="0"/>
+              <a:buChar char="•"/>
+            </a:pPr>
+            <a:r>
+              <a:rPr lang="fr-FR" b="1" dirty="0" smtClean="0"/>
+              <a:t>Server type : </a:t>
+            </a:r>
+            <a:r>
+              <a:rPr lang="fr-FR" dirty="0" smtClean="0"/>
+              <a:t>« </a:t>
+            </a:r>
+            <a:r>
+              <a:rPr lang="fr-FR" dirty="0" err="1" smtClean="0"/>
+              <a:t>Analysis</a:t>
+            </a:r>
+            <a:r>
+              <a:rPr lang="fr-FR" dirty="0" smtClean="0"/>
+              <a:t> Services »</a:t>
+            </a:r>
+          </a:p>
+          <a:p>
+            <a:pPr marL="285750" indent="-285750">
+              <a:spcBef>
+                <a:spcPts val="300"/>
+              </a:spcBef>
+              <a:spcAft>
+                <a:spcPts val="300"/>
+              </a:spcAft>
+              <a:buFont typeface="Arial" panose="020B0604020202020204" pitchFamily="34" charset="0"/>
+              <a:buChar char="•"/>
+            </a:pPr>
+            <a:r>
+              <a:rPr lang="fr-FR" b="1" dirty="0" smtClean="0"/>
+              <a:t>Server </a:t>
+            </a:r>
+            <a:r>
+              <a:rPr lang="fr-FR" b="1" dirty="0" err="1" smtClean="0"/>
+              <a:t>name</a:t>
+            </a:r>
+            <a:r>
+              <a:rPr lang="fr-FR" b="1" dirty="0" smtClean="0"/>
+              <a:t> </a:t>
+            </a:r>
+            <a:r>
+              <a:rPr lang="fr-FR" dirty="0"/>
+              <a:t>: Nom de votre </a:t>
+            </a:r>
+            <a:r>
+              <a:rPr lang="fr-FR" dirty="0" smtClean="0"/>
+              <a:t>PC</a:t>
+            </a:r>
+          </a:p>
+          <a:p>
+            <a:pPr marL="285750" indent="-285750">
+              <a:spcBef>
+                <a:spcPts val="300"/>
+              </a:spcBef>
+              <a:spcAft>
+                <a:spcPts val="300"/>
+              </a:spcAft>
+              <a:buFont typeface="Arial" panose="020B0604020202020204" pitchFamily="34" charset="0"/>
+              <a:buChar char="•"/>
+            </a:pPr>
+            <a:r>
+              <a:rPr lang="fr-FR" b="1" dirty="0" err="1" smtClean="0"/>
+              <a:t>Authentication</a:t>
+            </a:r>
+            <a:r>
+              <a:rPr lang="fr-FR" b="1" dirty="0" smtClean="0"/>
+              <a:t> </a:t>
+            </a:r>
+            <a:r>
+              <a:rPr lang="fr-FR" dirty="0"/>
+              <a:t> </a:t>
+            </a:r>
+            <a:r>
+              <a:rPr lang="fr-FR" dirty="0" smtClean="0"/>
+              <a:t>: « Windows </a:t>
+            </a:r>
+            <a:r>
+              <a:rPr lang="fr-FR" dirty="0" err="1" smtClean="0"/>
+              <a:t>authentication</a:t>
+            </a:r>
+            <a:r>
+              <a:rPr lang="fr-FR" dirty="0" smtClean="0"/>
+              <a:t> »</a:t>
+            </a:r>
+          </a:p>
+        </p:txBody>
+      </p:sp>
       <p:pic>
         <p:nvPicPr>
-          <p:cNvPr id="1027" name="Picture 3"/>
+          <p:cNvPr id="2" name="Image 1"/>
           <p:cNvPicPr>
-            <a:picLocks noChangeAspect="1" noChangeArrowheads="1"/>
+            <a:picLocks noChangeAspect="1"/>
           </p:cNvPicPr>
           <p:nvPr/>
         </p:nvPicPr>
         <p:blipFill>
-          <a:blip r:embed="rId3">
-            <a:extLst>
-              <a:ext uri="{28A0092B-C50C-407E-A947-70E740481C1C}">
-                <a14:useLocalDpi xmlns:a14="http://schemas.microsoft.com/office/drawing/2010/main" val="0"/>
-              </a:ext>
-            </a:extLst>
-          </a:blip>
-          <a:srcRect/>
+          <a:blip r:embed="rId3"/>
           <a:stretch>
             <a:fillRect/>
           </a:stretch>
         </p:blipFill>
-        <p:spPr bwMode="auto">
-          <a:xfrm>
-            <a:off x="5436096" y="4221088"/>
-            <a:ext cx="3362325" cy="600075"/>
-          </a:xfrm>
-          <a:prstGeom prst="rect">
-            <a:avLst/>
-          </a:prstGeom>
-          <a:noFill/>
-          <a:ln>
-            <a:noFill/>
-          </a:ln>
-          <a:extLst>
-            <a:ext uri="{909E8E84-426E-40DD-AFC4-6F175D3DCCD1}">
-              <a14:hiddenFill xmlns:a14="http://schemas.microsoft.com/office/drawing/2010/main">
-                <a:solidFill>
-                  <a:schemeClr val="accent1"/>
-                </a:solidFill>
-              </a14:hiddenFill>
-            </a:ext>
-            <a:ext uri="{91240B29-F687-4F45-9708-019B960494DF}">
-              <a14:hiddenLine xmlns:a14="http://schemas.microsoft.com/office/drawing/2010/main" w="9525">
-                <a:solidFill>
-                  <a:schemeClr val="tx1"/>
-                </a:solidFill>
-                <a:miter lim="800000"/>
-                <a:headEnd/>
-                <a:tailEnd/>
-              </a14:hiddenLine>
-            </a:ext>
-          </a:extLst>
+        <p:spPr>
+          <a:xfrm>
+            <a:off x="4860032" y="836712"/>
+            <a:ext cx="3744416" cy="2844397"/>
+          </a:xfrm>
+          <a:prstGeom prst="rect">
+            <a:avLst/>
+          </a:prstGeom>
         </p:spPr>
       </p:pic>
-      <p:sp>
-        <p:nvSpPr>
-          <p:cNvPr id="13" name="Rectangle 12"/>
-          <p:cNvSpPr/>
-          <p:nvPr/>
-        </p:nvSpPr>
-        <p:spPr>
-          <a:xfrm>
-            <a:off x="270902" y="5385990"/>
-            <a:ext cx="8208912" cy="923330"/>
-          </a:xfrm>
-          <a:prstGeom prst="rect">
-            <a:avLst/>
-          </a:prstGeom>
-        </p:spPr>
-        <p:txBody>
-          <a:bodyPr wrap="square">
-            <a:spAutoFit/>
-          </a:bodyPr>
-          <a:lstStyle/>
-          <a:p>
-            <a:r>
-              <a:rPr lang="fr-FR" b="1" dirty="0" smtClean="0"/>
-              <a:t>Arrêt des services </a:t>
-            </a:r>
-            <a:r>
-              <a:rPr lang="fr-FR" dirty="0" smtClean="0"/>
-              <a:t>: </a:t>
-            </a:r>
-            <a:endParaRPr lang="fr-FR" dirty="0"/>
-          </a:p>
-          <a:p>
-            <a:r>
-              <a:rPr lang="fr-FR" dirty="0" smtClean="0"/>
-              <a:t>Sur les services de SQL Server démarrés, cliquer-droit pour le menu contextuel &gt; « </a:t>
-            </a:r>
-            <a:r>
-              <a:rPr lang="fr-FR" b="1" dirty="0" smtClean="0"/>
-              <a:t>Arrêter</a:t>
-            </a:r>
-            <a:r>
-              <a:rPr lang="fr-FR" dirty="0" smtClean="0"/>
-              <a:t> »</a:t>
-            </a:r>
-          </a:p>
-        </p:txBody>
-      </p:sp>
-      <p:sp>
-        <p:nvSpPr>
-          <p:cNvPr id="17" name="Rectangle 16"/>
-          <p:cNvSpPr/>
-          <p:nvPr/>
-        </p:nvSpPr>
-        <p:spPr>
-          <a:xfrm>
-            <a:off x="323528" y="799544"/>
-            <a:ext cx="8208912" cy="1477328"/>
-          </a:xfrm>
-          <a:prstGeom prst="rect">
-            <a:avLst/>
-          </a:prstGeom>
-        </p:spPr>
-        <p:txBody>
-          <a:bodyPr wrap="square">
-            <a:spAutoFit/>
-          </a:bodyPr>
-          <a:lstStyle/>
-          <a:p>
-            <a:r>
-              <a:rPr lang="fr-FR" b="1" dirty="0" smtClean="0"/>
-              <a:t>But </a:t>
-            </a:r>
-            <a:r>
-              <a:rPr lang="fr-FR" dirty="0" smtClean="0"/>
-              <a:t>: </a:t>
-            </a:r>
-            <a:endParaRPr lang="fr-FR" dirty="0"/>
-          </a:p>
-          <a:p>
-            <a:r>
-              <a:rPr lang="fr-FR" dirty="0" smtClean="0"/>
-              <a:t>Lors de l’installation, nous avons paramétrés les services de SQL Server en démarrage manuel, afin de ne pas surcharger votre PC en dehors des périodes de développent.</a:t>
-            </a:r>
-          </a:p>
-          <a:p>
-            <a:pPr marL="342900" indent="-342900">
-              <a:buFont typeface="+mj-lt"/>
-              <a:buAutoNum type="arabicPeriod"/>
-            </a:pPr>
-            <a:r>
-              <a:rPr lang="fr-FR" dirty="0" smtClean="0"/>
-              <a:t>Avant de développer, il faudra démarrer les services associés à SQL Server.</a:t>
-            </a:r>
-          </a:p>
-          <a:p>
-            <a:pPr marL="342900" indent="-342900">
-              <a:buFont typeface="+mj-lt"/>
-              <a:buAutoNum type="arabicPeriod"/>
-            </a:pPr>
-            <a:r>
-              <a:rPr lang="fr-FR" dirty="0" smtClean="0"/>
-              <a:t>En fin de développement, vous pouvez les arrêter.</a:t>
-            </a:r>
-          </a:p>
-        </p:txBody>
-      </p:sp>
       <p:pic>
         <p:nvPicPr>
-          <p:cNvPr id="1028" name="Picture 4"/>
+          <p:cNvPr id="3" name="Image 2"/>
           <p:cNvPicPr>
-            <a:picLocks noChangeAspect="1" noChangeArrowheads="1"/>
+            <a:picLocks noChangeAspect="1"/>
           </p:cNvPicPr>
           <p:nvPr/>
         </p:nvPicPr>
         <p:blipFill>
-          <a:blip r:embed="rId4">
-            <a:extLst>
-              <a:ext uri="{28A0092B-C50C-407E-A947-70E740481C1C}">
-                <a14:useLocalDpi xmlns:a14="http://schemas.microsoft.com/office/drawing/2010/main" val="0"/>
-              </a:ext>
-            </a:extLst>
-          </a:blip>
-          <a:srcRect/>
+          <a:blip r:embed="rId4"/>
           <a:stretch>
             <a:fillRect/>
           </a:stretch>
         </p:blipFill>
-        <p:spPr bwMode="auto">
-          <a:xfrm>
-            <a:off x="6648053" y="2710661"/>
-            <a:ext cx="2152650" cy="1276350"/>
-          </a:xfrm>
-          <a:prstGeom prst="rect">
-            <a:avLst/>
-          </a:prstGeom>
-          <a:noFill/>
-          <a:ln>
-            <a:noFill/>
-          </a:ln>
-          <a:extLst>
-            <a:ext uri="{909E8E84-426E-40DD-AFC4-6F175D3DCCD1}">
-              <a14:hiddenFill xmlns:a14="http://schemas.microsoft.com/office/drawing/2010/main">
-                <a:solidFill>
-                  <a:schemeClr val="accent1"/>
-                </a:solidFill>
-              </a14:hiddenFill>
-            </a:ext>
-            <a:ext uri="{91240B29-F687-4F45-9708-019B960494DF}">
-              <a14:hiddenLine xmlns:a14="http://schemas.microsoft.com/office/drawing/2010/main" w="9525">
-                <a:solidFill>
-                  <a:schemeClr val="tx1"/>
-                </a:solidFill>
-                <a:miter lim="800000"/>
-                <a:headEnd/>
-                <a:tailEnd/>
-              </a14:hiddenLine>
-            </a:ext>
-          </a:extLst>
+        <p:spPr>
+          <a:xfrm>
+            <a:off x="4860032" y="3798040"/>
+            <a:ext cx="3744416" cy="2880978"/>
+          </a:xfrm>
+          <a:prstGeom prst="rect">
+            <a:avLst/>
+          </a:prstGeom>
         </p:spPr>
       </p:pic>
     </p:spTree>
     <p:extLst>
       <p:ext uri="{BB962C8B-B14F-4D97-AF65-F5344CB8AC3E}">
-        <p14:creationId xmlns:p14="http://schemas.microsoft.com/office/powerpoint/2010/main" val="1924415414"/>
+        <p14:creationId xmlns:p14="http://schemas.microsoft.com/office/powerpoint/2010/main" val="308545997"/>
       </p:ext>
     </p:extLst>
   </p:cSld>
@@ -20892,14 +20882,14 @@
       </p:grpSpPr>
       <p:sp>
         <p:nvSpPr>
-          <p:cNvPr id="8" name="ZoneTexte 7"/>
+          <p:cNvPr id="4" name="ZoneTexte 3"/>
           <p:cNvSpPr txBox="1"/>
           <p:nvPr/>
         </p:nvSpPr>
         <p:spPr>
           <a:xfrm>
-            <a:off x="129238" y="98167"/>
-            <a:ext cx="1728192" cy="369332"/>
+            <a:off x="107502" y="116632"/>
+            <a:ext cx="1385165" cy="369332"/>
           </a:xfrm>
           <a:prstGeom prst="rect">
             <a:avLst/>
@@ -20923,362 +20913,19 @@
           <a:bodyPr wrap="square" rtlCol="0">
             <a:spAutoFit/>
           </a:bodyPr>
-          <a:lstStyle>
-            <a:defPPr>
-              <a:defRPr lang="fr-FR"/>
-            </a:defPPr>
-            <a:lvl1pPr>
-              <a:defRPr>
-                <a:solidFill>
-                  <a:schemeClr val="dk1"/>
-                </a:solidFill>
-              </a:defRPr>
-            </a:lvl1pPr>
-            <a:lvl2pPr>
-              <a:defRPr>
-                <a:solidFill>
-                  <a:schemeClr val="dk1"/>
-                </a:solidFill>
-              </a:defRPr>
-            </a:lvl2pPr>
-            <a:lvl3pPr>
-              <a:defRPr>
-                <a:solidFill>
-                  <a:schemeClr val="dk1"/>
-                </a:solidFill>
-              </a:defRPr>
-            </a:lvl3pPr>
-            <a:lvl4pPr>
-              <a:defRPr>
-                <a:solidFill>
-                  <a:schemeClr val="dk1"/>
-                </a:solidFill>
-              </a:defRPr>
-            </a:lvl4pPr>
-            <a:lvl5pPr>
-              <a:defRPr>
-                <a:solidFill>
-                  <a:schemeClr val="dk1"/>
-                </a:solidFill>
-              </a:defRPr>
-            </a:lvl5pPr>
-            <a:lvl6pPr>
-              <a:defRPr>
-                <a:solidFill>
-                  <a:schemeClr val="dk1"/>
-                </a:solidFill>
-              </a:defRPr>
-            </a:lvl6pPr>
-            <a:lvl7pPr>
-              <a:defRPr>
-                <a:solidFill>
-                  <a:schemeClr val="dk1"/>
-                </a:solidFill>
-              </a:defRPr>
-            </a:lvl7pPr>
-            <a:lvl8pPr>
-              <a:defRPr>
-                <a:solidFill>
-                  <a:schemeClr val="dk1"/>
-                </a:solidFill>
-              </a:defRPr>
-            </a:lvl8pPr>
-            <a:lvl9pPr>
-              <a:defRPr>
-                <a:solidFill>
-                  <a:schemeClr val="dk1"/>
-                </a:solidFill>
-              </a:defRPr>
-            </a:lvl9pPr>
-          </a:lstStyle>
-          <a:p>
-            <a:r>
-              <a:rPr lang="fr-FR" dirty="0"/>
-              <a:t>Configuration</a:t>
-            </a:r>
-          </a:p>
-        </p:txBody>
-      </p:sp>
-      <p:sp>
-        <p:nvSpPr>
-          <p:cNvPr id="2" name="Rectangle 1"/>
-          <p:cNvSpPr/>
-          <p:nvPr/>
-        </p:nvSpPr>
-        <p:spPr>
-          <a:xfrm>
-            <a:off x="129238" y="764704"/>
-            <a:ext cx="8763242" cy="4847481"/>
-          </a:xfrm>
-          <a:prstGeom prst="rect">
-            <a:avLst/>
-          </a:prstGeom>
-        </p:spPr>
-        <p:txBody>
-          <a:bodyPr wrap="square">
-            <a:spAutoFit/>
-          </a:bodyPr>
-          <a:lstStyle/>
-          <a:p>
-            <a:r>
-              <a:rPr lang="fr-FR" sz="1500" b="1" dirty="0" smtClean="0"/>
-              <a:t>JAVA : Configuration </a:t>
-            </a:r>
-            <a:r>
-              <a:rPr lang="fr-FR" sz="1500" b="1" dirty="0"/>
-              <a:t>de la variable PATH sous </a:t>
-            </a:r>
-            <a:r>
-              <a:rPr lang="fr-FR" sz="1500" b="1" dirty="0" smtClean="0"/>
-              <a:t>Windows</a:t>
-            </a:r>
-          </a:p>
-          <a:p>
-            <a:endParaRPr lang="fr-FR" sz="1400" b="1" dirty="0"/>
-          </a:p>
-          <a:p>
-            <a:r>
-              <a:rPr lang="fr-FR" sz="1400" b="1" dirty="0"/>
-              <a:t>Windows 8</a:t>
-            </a:r>
-          </a:p>
-          <a:p>
-            <a:pPr marL="342900" indent="-342900">
-              <a:buFont typeface="+mj-lt"/>
-              <a:buAutoNum type="arabicPeriod"/>
-            </a:pPr>
-            <a:r>
-              <a:rPr lang="fr-FR" sz="1400" dirty="0" smtClean="0"/>
-              <a:t>Déplacez le pointeur de la souris vers l'angle inférieur droit de l'écran.</a:t>
-            </a:r>
-          </a:p>
-          <a:p>
-            <a:pPr marL="342900" indent="-342900">
-              <a:buFont typeface="+mj-lt"/>
-              <a:buAutoNum type="arabicPeriod"/>
-            </a:pPr>
-            <a:r>
-              <a:rPr lang="fr-FR" sz="1400" dirty="0" smtClean="0"/>
-              <a:t>Cliquez sur l'icône Rechercher et saisissez "Panneau de configuration".</a:t>
-            </a:r>
-          </a:p>
-          <a:p>
-            <a:pPr marL="342900" indent="-342900">
-              <a:buFont typeface="+mj-lt"/>
-              <a:buAutoNum type="arabicPeriod"/>
-            </a:pPr>
-            <a:r>
-              <a:rPr lang="fr-FR" sz="1400" dirty="0" smtClean="0"/>
-              <a:t>Cliquez </a:t>
-            </a:r>
-            <a:r>
-              <a:rPr lang="fr-FR" sz="1400" dirty="0"/>
-              <a:t>sur Panneau de configuration -&gt; Système -&gt; Avancé</a:t>
-            </a:r>
-          </a:p>
-          <a:p>
-            <a:pPr marL="342900" indent="-342900">
-              <a:buFont typeface="+mj-lt"/>
-              <a:buAutoNum type="arabicPeriod"/>
-            </a:pPr>
-            <a:r>
-              <a:rPr lang="fr-FR" sz="1400" dirty="0"/>
-              <a:t>Cliquez sur Variables d'environnement, puis, sous Variables système, recherchez la valeur </a:t>
-            </a:r>
-            <a:r>
-              <a:rPr lang="fr-FR" sz="1400" b="1" dirty="0"/>
-              <a:t>PATH</a:t>
-            </a:r>
-            <a:r>
-              <a:rPr lang="fr-FR" sz="1400" dirty="0"/>
-              <a:t> et cliquez dessus.</a:t>
-            </a:r>
-          </a:p>
-          <a:p>
-            <a:pPr marL="342900" indent="-342900">
-              <a:buFont typeface="+mj-lt"/>
-              <a:buAutoNum type="arabicPeriod"/>
-            </a:pPr>
-            <a:r>
-              <a:rPr lang="fr-FR" sz="1400" dirty="0"/>
-              <a:t>Dans la fenêtre d'édition, modifiez </a:t>
-            </a:r>
-            <a:r>
-              <a:rPr lang="fr-FR" sz="1400" b="1" dirty="0"/>
-              <a:t>PATH</a:t>
-            </a:r>
-            <a:r>
-              <a:rPr lang="fr-FR" sz="1400" dirty="0"/>
-              <a:t> en ajoutant l'emplacement de la classe à la valeur de </a:t>
-            </a:r>
-            <a:r>
-              <a:rPr lang="fr-FR" sz="1400" b="1" dirty="0"/>
-              <a:t>PATH</a:t>
-            </a:r>
-            <a:r>
-              <a:rPr lang="fr-FR" sz="1400" dirty="0"/>
-              <a:t>. Si l'élément </a:t>
-            </a:r>
-            <a:r>
-              <a:rPr lang="fr-FR" sz="1400" b="1" dirty="0"/>
-              <a:t>PATH</a:t>
-            </a:r>
-            <a:r>
-              <a:rPr lang="fr-FR" sz="1400" dirty="0"/>
-              <a:t> n'est pas disponible, vous pouvez ajouter une nouvelle variable et ajouter </a:t>
-            </a:r>
-            <a:r>
-              <a:rPr lang="fr-FR" sz="1400" b="1" dirty="0"/>
-              <a:t>PATH</a:t>
-            </a:r>
-            <a:r>
-              <a:rPr lang="fr-FR" sz="1400" dirty="0"/>
-              <a:t> en tant que nom et l'emplacement de la classe en tant que valeur.</a:t>
-            </a:r>
-          </a:p>
-          <a:p>
-            <a:pPr marL="342900" indent="-342900">
-              <a:buFont typeface="+mj-lt"/>
-              <a:buAutoNum type="arabicPeriod"/>
-            </a:pPr>
-            <a:r>
-              <a:rPr lang="fr-FR" sz="1400" dirty="0"/>
-              <a:t>Fermez la fenêtre.</a:t>
-            </a:r>
-          </a:p>
-          <a:p>
-            <a:pPr marL="342900" indent="-342900">
-              <a:buFont typeface="+mj-lt"/>
-              <a:buAutoNum type="arabicPeriod"/>
-            </a:pPr>
-            <a:r>
-              <a:rPr lang="fr-FR" sz="1400" dirty="0"/>
-              <a:t>Ouvrez à nouveau la fenêtre d'invite de commande  et tapez « java –version » : Doit retourner « Oracle JDK 1.8… »</a:t>
-            </a:r>
-          </a:p>
-          <a:p>
-            <a:endParaRPr lang="fr-FR" sz="1400" b="1" dirty="0" smtClean="0"/>
-          </a:p>
-          <a:p>
-            <a:r>
-              <a:rPr lang="fr-FR" sz="1400" b="1" dirty="0" smtClean="0"/>
-              <a:t>Windows </a:t>
-            </a:r>
-            <a:r>
-              <a:rPr lang="fr-FR" sz="1400" b="1" dirty="0"/>
-              <a:t>7</a:t>
-            </a:r>
-          </a:p>
-          <a:p>
-            <a:pPr marL="342900" indent="-342900">
-              <a:buFont typeface="+mj-lt"/>
-              <a:buAutoNum type="arabicPeriod"/>
-            </a:pPr>
-            <a:r>
-              <a:rPr lang="fr-FR" sz="1400" dirty="0"/>
-              <a:t>Sélectionnez Ordinateur dans le menu Démarrer.</a:t>
-            </a:r>
-          </a:p>
-          <a:p>
-            <a:pPr marL="342900" indent="-342900">
-              <a:buFont typeface="+mj-lt"/>
-              <a:buAutoNum type="arabicPeriod"/>
-            </a:pPr>
-            <a:r>
-              <a:rPr lang="fr-FR" sz="1400" dirty="0"/>
-              <a:t>Choisissez Propriétés du système dans le menu contextuel.</a:t>
-            </a:r>
-          </a:p>
-          <a:p>
-            <a:pPr marL="342900" indent="-342900">
-              <a:buFont typeface="+mj-lt"/>
-              <a:buAutoNum type="arabicPeriod"/>
-            </a:pPr>
-            <a:r>
-              <a:rPr lang="fr-FR" sz="1400" dirty="0"/>
-              <a:t>Dans l'onglet Avancé, cliquez sur les paramètres système avancés.</a:t>
-            </a:r>
-          </a:p>
-          <a:p>
-            <a:pPr marL="342900" indent="-342900">
-              <a:buFont typeface="+mj-lt"/>
-              <a:buAutoNum type="arabicPeriod"/>
-            </a:pPr>
-            <a:r>
-              <a:rPr lang="fr-FR" sz="1400" dirty="0"/>
-              <a:t>Cliquez sur Variables d'environnement, puis, sous Variables système, recherchez la valeur </a:t>
-            </a:r>
-            <a:r>
-              <a:rPr lang="fr-FR" sz="1400" b="1" dirty="0"/>
-              <a:t>PATH</a:t>
-            </a:r>
-            <a:r>
-              <a:rPr lang="fr-FR" sz="1400" dirty="0"/>
-              <a:t> et cliquez dessus.</a:t>
-            </a:r>
-          </a:p>
-          <a:p>
-            <a:pPr marL="342900" indent="-342900">
-              <a:buFont typeface="+mj-lt"/>
-              <a:buAutoNum type="arabicPeriod"/>
-            </a:pPr>
-            <a:r>
-              <a:rPr lang="fr-FR" sz="1400" dirty="0"/>
-              <a:t>Dans la fenêtre d'édition, modifiez </a:t>
-            </a:r>
-            <a:r>
-              <a:rPr lang="fr-FR" sz="1400" b="1" dirty="0"/>
-              <a:t>PATH</a:t>
-            </a:r>
-            <a:r>
-              <a:rPr lang="fr-FR" sz="1400" dirty="0"/>
-              <a:t> en ajoutant l'emplacement de la classe à la valeur de </a:t>
-            </a:r>
-            <a:r>
-              <a:rPr lang="fr-FR" sz="1400" b="1" dirty="0"/>
-              <a:t>PATH</a:t>
-            </a:r>
-            <a:r>
-              <a:rPr lang="fr-FR" sz="1400" dirty="0"/>
-              <a:t>. Si l'élément </a:t>
-            </a:r>
-            <a:r>
-              <a:rPr lang="fr-FR" sz="1400" b="1" dirty="0"/>
-              <a:t>PATH</a:t>
-            </a:r>
-            <a:r>
-              <a:rPr lang="fr-FR" sz="1400" dirty="0"/>
-              <a:t> n'est pas disponible, vous pouvez ajouter une nouvelle variable et ajouter </a:t>
-            </a:r>
-            <a:r>
-              <a:rPr lang="fr-FR" sz="1400" b="1" dirty="0"/>
-              <a:t>PATH</a:t>
-            </a:r>
-            <a:r>
-              <a:rPr lang="fr-FR" sz="1400" dirty="0"/>
-              <a:t> en tant que nom et l'emplacement de la classe en tant que valeur.</a:t>
-            </a:r>
-          </a:p>
-          <a:p>
-            <a:pPr marL="342900" indent="-342900">
-              <a:buFont typeface="+mj-lt"/>
-              <a:buAutoNum type="arabicPeriod"/>
-            </a:pPr>
-            <a:r>
-              <a:rPr lang="fr-FR" sz="1400" dirty="0"/>
-              <a:t>Ouvrez à nouveau la fenêtre d'invite de commande et </a:t>
-            </a:r>
-            <a:r>
-              <a:rPr lang="fr-FR" sz="1400" dirty="0" smtClean="0"/>
-              <a:t>tapez « java –version » : Doit retourner « Oracle JDK 1.8… »</a:t>
-            </a:r>
-            <a:endParaRPr lang="fr-FR" sz="1400" dirty="0"/>
-          </a:p>
-        </p:txBody>
-      </p:sp>
-      <p:sp>
-        <p:nvSpPr>
-          <p:cNvPr id="4" name="Rectangle 3"/>
+          <a:lstStyle/>
+          <a:p>
+            <a:r>
+              <a:rPr lang="fr-FR" dirty="0" smtClean="0"/>
+              <a:t>Installation</a:t>
+            </a:r>
+            <a:endParaRPr lang="fr-FR" dirty="0"/>
+          </a:p>
+        </p:txBody>
+      </p:sp>
+      <p:sp>
+        <p:nvSpPr>
+          <p:cNvPr id="13" name="Rectangle 12"/>
           <p:cNvSpPr/>
           <p:nvPr/>
         </p:nvSpPr>
@@ -21320,10 +20967,306 @@
           </a:p>
         </p:txBody>
       </p:sp>
+      <p:sp>
+        <p:nvSpPr>
+          <p:cNvPr id="2" name="Rectangle 1"/>
+          <p:cNvSpPr/>
+          <p:nvPr/>
+        </p:nvSpPr>
+        <p:spPr>
+          <a:xfrm>
+            <a:off x="800084" y="3501008"/>
+            <a:ext cx="6174432" cy="2846933"/>
+          </a:xfrm>
+          <a:prstGeom prst="rect">
+            <a:avLst/>
+          </a:prstGeom>
+        </p:spPr>
+        <p:txBody>
+          <a:bodyPr wrap="square">
+            <a:spAutoFit/>
+          </a:bodyPr>
+          <a:lstStyle/>
+          <a:p>
+            <a:pPr>
+              <a:spcBef>
+                <a:spcPts val="300"/>
+              </a:spcBef>
+              <a:spcAft>
+                <a:spcPts val="300"/>
+              </a:spcAft>
+            </a:pPr>
+            <a:r>
+              <a:rPr lang="fr-FR" b="1" dirty="0"/>
+              <a:t>Alternative à Oracle JDK</a:t>
+            </a:r>
+          </a:p>
+          <a:p>
+            <a:pPr>
+              <a:spcBef>
+                <a:spcPts val="300"/>
+              </a:spcBef>
+              <a:spcAft>
+                <a:spcPts val="300"/>
+              </a:spcAft>
+            </a:pPr>
+            <a:r>
+              <a:rPr lang="fr-FR" dirty="0"/>
+              <a:t>Par souci de compatibilité, conservez la JDK </a:t>
+            </a:r>
+            <a:r>
+              <a:rPr lang="fr-FR" dirty="0" smtClean="0"/>
+              <a:t>d’Oracle</a:t>
+            </a:r>
+          </a:p>
+          <a:p>
+            <a:pPr>
+              <a:spcBef>
+                <a:spcPts val="300"/>
+              </a:spcBef>
+              <a:spcAft>
+                <a:spcPts val="300"/>
+              </a:spcAft>
+            </a:pPr>
+            <a:endParaRPr lang="fr-FR" dirty="0" smtClean="0"/>
+          </a:p>
+          <a:p>
+            <a:pPr>
+              <a:spcBef>
+                <a:spcPts val="300"/>
+              </a:spcBef>
+              <a:spcAft>
+                <a:spcPts val="300"/>
+              </a:spcAft>
+            </a:pPr>
+            <a:r>
+              <a:rPr lang="fr-FR" b="1" dirty="0" smtClean="0"/>
+              <a:t>Alternative </a:t>
+            </a:r>
+            <a:r>
+              <a:rPr lang="fr-FR" b="1" dirty="0"/>
+              <a:t>à </a:t>
+            </a:r>
+            <a:r>
+              <a:rPr lang="fr-FR" b="1" dirty="0" err="1"/>
+              <a:t>NetBeans</a:t>
+            </a:r>
+            <a:r>
+              <a:rPr lang="fr-FR" b="1" dirty="0"/>
+              <a:t> EE</a:t>
+            </a:r>
+          </a:p>
+          <a:p>
+            <a:pPr>
+              <a:spcBef>
+                <a:spcPts val="300"/>
+              </a:spcBef>
+              <a:spcAft>
+                <a:spcPts val="300"/>
+              </a:spcAft>
+            </a:pPr>
+            <a:r>
+              <a:rPr lang="fr-FR" dirty="0"/>
+              <a:t>Eclipse ou tout autre IDE de </a:t>
+            </a:r>
+            <a:r>
+              <a:rPr lang="fr-FR" dirty="0" smtClean="0"/>
+              <a:t>développement</a:t>
+            </a:r>
+          </a:p>
+          <a:p>
+            <a:pPr>
+              <a:spcBef>
+                <a:spcPts val="300"/>
+              </a:spcBef>
+              <a:spcAft>
+                <a:spcPts val="300"/>
+              </a:spcAft>
+            </a:pPr>
+            <a:endParaRPr lang="fr-FR" dirty="0" smtClean="0"/>
+          </a:p>
+          <a:p>
+            <a:pPr>
+              <a:spcBef>
+                <a:spcPts val="300"/>
+              </a:spcBef>
+              <a:spcAft>
+                <a:spcPts val="300"/>
+              </a:spcAft>
+            </a:pPr>
+            <a:r>
+              <a:rPr lang="fr-FR" b="1" dirty="0" smtClean="0"/>
+              <a:t>Alternative </a:t>
+            </a:r>
+            <a:r>
+              <a:rPr lang="fr-FR" b="1" dirty="0"/>
+              <a:t>à </a:t>
+            </a:r>
+            <a:r>
+              <a:rPr lang="fr-FR" b="1" dirty="0" err="1"/>
+              <a:t>GlassFish</a:t>
+            </a:r>
+            <a:endParaRPr lang="fr-FR" b="1" dirty="0"/>
+          </a:p>
+          <a:p>
+            <a:pPr>
+              <a:spcBef>
+                <a:spcPts val="300"/>
+              </a:spcBef>
+              <a:spcAft>
+                <a:spcPts val="300"/>
+              </a:spcAft>
+            </a:pPr>
+            <a:r>
+              <a:rPr lang="fr-FR" dirty="0" err="1"/>
+              <a:t>Tomcat</a:t>
+            </a:r>
+            <a:r>
+              <a:rPr lang="fr-FR" dirty="0"/>
+              <a:t> ou tout autre serveur applicatif supportant Java </a:t>
+            </a:r>
+            <a:r>
+              <a:rPr lang="fr-FR" dirty="0" smtClean="0"/>
+              <a:t>1.8</a:t>
+            </a:r>
+            <a:endParaRPr lang="fr-FR" dirty="0"/>
+          </a:p>
+        </p:txBody>
+      </p:sp>
+      <p:sp>
+        <p:nvSpPr>
+          <p:cNvPr id="5" name="ZoneTexte 4"/>
+          <p:cNvSpPr txBox="1"/>
+          <p:nvPr/>
+        </p:nvSpPr>
+        <p:spPr>
+          <a:xfrm>
+            <a:off x="107502" y="2973206"/>
+            <a:ext cx="1385165" cy="369332"/>
+          </a:xfrm>
+          <a:prstGeom prst="rect">
+            <a:avLst/>
+          </a:prstGeom>
+        </p:spPr>
+        <p:style>
+          <a:lnRef idx="1">
+            <a:schemeClr val="accent1"/>
+          </a:lnRef>
+          <a:fillRef idx="2">
+            <a:schemeClr val="accent1"/>
+          </a:fillRef>
+          <a:effectRef idx="1">
+            <a:schemeClr val="accent1"/>
+          </a:effectRef>
+          <a:fontRef idx="minor">
+            <a:schemeClr val="dk1"/>
+          </a:fontRef>
+        </p:style>
+        <p:txBody>
+          <a:bodyPr wrap="square" rtlCol="0">
+            <a:spAutoFit/>
+          </a:bodyPr>
+          <a:lstStyle/>
+          <a:p>
+            <a:r>
+              <a:rPr lang="fr-FR" dirty="0" smtClean="0"/>
+              <a:t>Alternatives</a:t>
+            </a:r>
+            <a:endParaRPr lang="fr-FR" dirty="0"/>
+          </a:p>
+        </p:txBody>
+      </p:sp>
+      <p:sp>
+        <p:nvSpPr>
+          <p:cNvPr id="6" name="Rectangle 5"/>
+          <p:cNvSpPr/>
+          <p:nvPr/>
+        </p:nvSpPr>
+        <p:spPr>
+          <a:xfrm>
+            <a:off x="755576" y="635784"/>
+            <a:ext cx="6174432" cy="1785104"/>
+          </a:xfrm>
+          <a:prstGeom prst="rect">
+            <a:avLst/>
+          </a:prstGeom>
+        </p:spPr>
+        <p:txBody>
+          <a:bodyPr wrap="square">
+            <a:spAutoFit/>
+          </a:bodyPr>
+          <a:lstStyle/>
+          <a:p>
+            <a:pPr>
+              <a:spcBef>
+                <a:spcPts val="300"/>
+              </a:spcBef>
+              <a:spcAft>
+                <a:spcPts val="300"/>
+              </a:spcAft>
+            </a:pPr>
+            <a:r>
+              <a:rPr lang="fr-FR" dirty="0" smtClean="0"/>
+              <a:t>Lancer le fichier téléchargé et suivre l’installeur</a:t>
+            </a:r>
+          </a:p>
+          <a:p>
+            <a:pPr>
+              <a:spcBef>
+                <a:spcPts val="300"/>
+              </a:spcBef>
+              <a:spcAft>
+                <a:spcPts val="300"/>
+              </a:spcAft>
+            </a:pPr>
+            <a:endParaRPr lang="fr-FR" dirty="0"/>
+          </a:p>
+          <a:p>
+            <a:pPr>
+              <a:spcBef>
+                <a:spcPts val="300"/>
+              </a:spcBef>
+              <a:spcAft>
+                <a:spcPts val="300"/>
+              </a:spcAft>
+            </a:pPr>
+            <a:r>
+              <a:rPr lang="fr-FR" dirty="0" smtClean="0"/>
+              <a:t>Activer la recherche auto des MAJ Java</a:t>
+            </a:r>
+          </a:p>
+          <a:p>
+            <a:pPr>
+              <a:spcBef>
+                <a:spcPts val="300"/>
+              </a:spcBef>
+              <a:spcAft>
+                <a:spcPts val="300"/>
+              </a:spcAft>
+            </a:pPr>
+            <a:endParaRPr lang="fr-FR" dirty="0"/>
+          </a:p>
+          <a:p>
+            <a:pPr>
+              <a:spcBef>
+                <a:spcPts val="300"/>
+              </a:spcBef>
+              <a:spcAft>
+                <a:spcPts val="300"/>
+              </a:spcAft>
+            </a:pPr>
+            <a:r>
+              <a:rPr lang="fr-FR" dirty="0" smtClean="0"/>
+              <a:t>Sous Windows 8, le PATH sera positionné automatiquement</a:t>
+            </a:r>
+            <a:endParaRPr lang="fr-FR" dirty="0"/>
+          </a:p>
+        </p:txBody>
+      </p:sp>
     </p:spTree>
     <p:extLst>
       <p:ext uri="{BB962C8B-B14F-4D97-AF65-F5344CB8AC3E}">
-        <p14:creationId xmlns:p14="http://schemas.microsoft.com/office/powerpoint/2010/main" val="1633107092"/>
+        <p14:creationId xmlns:p14="http://schemas.microsoft.com/office/powerpoint/2010/main" val="3566518766"/>
       </p:ext>
     </p:extLst>
   </p:cSld>
@@ -21365,247 +21308,46 @@
         </p:nvSpPr>
         <p:spPr>
           <a:xfrm>
-            <a:off x="107502" y="116632"/>
-            <a:ext cx="1385165" cy="369332"/>
+            <a:off x="1296174" y="2348880"/>
+            <a:ext cx="6984776" cy="707886"/>
           </a:xfrm>
           <a:prstGeom prst="rect">
             <a:avLst/>
           </a:prstGeom>
         </p:spPr>
         <p:style>
-          <a:lnRef idx="1">
+          <a:lnRef idx="0">
             <a:schemeClr val="accent1"/>
           </a:lnRef>
-          <a:fillRef idx="2">
+          <a:fillRef idx="3">
             <a:schemeClr val="accent1"/>
           </a:fillRef>
-          <a:effectRef idx="1">
+          <a:effectRef idx="3">
             <a:schemeClr val="accent1"/>
-          </a:effectRef>
-          <a:fontRef idx="minor">
-            <a:schemeClr val="dk1"/>
-          </a:fontRef>
-        </p:style>
-        <p:txBody>
-          <a:bodyPr wrap="square" rtlCol="0">
-            <a:spAutoFit/>
-          </a:bodyPr>
-          <a:lstStyle/>
-          <a:p>
-            <a:r>
-              <a:rPr lang="fr-FR" dirty="0" smtClean="0"/>
-              <a:t>Alternatives</a:t>
-            </a:r>
-            <a:endParaRPr lang="fr-FR" dirty="0"/>
-          </a:p>
-        </p:txBody>
-      </p:sp>
-      <p:sp>
-        <p:nvSpPr>
-          <p:cNvPr id="13" name="Rectangle 12"/>
-          <p:cNvSpPr/>
-          <p:nvPr/>
-        </p:nvSpPr>
-        <p:spPr>
-          <a:xfrm>
-            <a:off x="6876256" y="188640"/>
-            <a:ext cx="2016224" cy="432048"/>
-          </a:xfrm>
-          <a:prstGeom prst="rect">
-            <a:avLst/>
-          </a:prstGeom>
-        </p:spPr>
-        <p:style>
-          <a:lnRef idx="2">
-            <a:schemeClr val="accent2">
-              <a:shade val="50000"/>
-            </a:schemeClr>
-          </a:lnRef>
-          <a:fillRef idx="1">
-            <a:schemeClr val="accent2"/>
-          </a:fillRef>
-          <a:effectRef idx="0">
-            <a:schemeClr val="accent2"/>
           </a:effectRef>
           <a:fontRef idx="minor">
             <a:schemeClr val="lt1"/>
           </a:fontRef>
         </p:style>
         <p:txBody>
-          <a:bodyPr rtlCol="0" anchor="ctr"/>
-          <a:lstStyle/>
-          <a:p>
-            <a:pPr algn="ctr"/>
-            <a:r>
-              <a:rPr lang="fr-FR" dirty="0" smtClean="0"/>
-              <a:t>Equipe 2</a:t>
-            </a:r>
-            <a:endParaRPr lang="fr-FR" dirty="0"/>
-          </a:p>
-        </p:txBody>
-      </p:sp>
-      <p:sp>
-        <p:nvSpPr>
-          <p:cNvPr id="2" name="Rectangle 1"/>
-          <p:cNvSpPr/>
-          <p:nvPr/>
-        </p:nvSpPr>
-        <p:spPr>
-          <a:xfrm>
-            <a:off x="701824" y="1543868"/>
-            <a:ext cx="6174432" cy="2846933"/>
-          </a:xfrm>
-          <a:prstGeom prst="rect">
-            <a:avLst/>
-          </a:prstGeom>
-        </p:spPr>
-        <p:txBody>
-          <a:bodyPr wrap="square">
+          <a:bodyPr wrap="square" rtlCol="0">
             <a:spAutoFit/>
           </a:bodyPr>
           <a:lstStyle/>
           <a:p>
-            <a:pPr>
-              <a:spcBef>
-                <a:spcPts val="300"/>
-              </a:spcBef>
-              <a:spcAft>
-                <a:spcPts val="300"/>
-              </a:spcAft>
-            </a:pPr>
-            <a:r>
-              <a:rPr lang="fr-FR" b="1" dirty="0"/>
-              <a:t>Alternative à Oracle JDK</a:t>
-            </a:r>
-          </a:p>
-          <a:p>
-            <a:pPr>
-              <a:spcBef>
-                <a:spcPts val="300"/>
-              </a:spcBef>
-              <a:spcAft>
-                <a:spcPts val="300"/>
-              </a:spcAft>
-            </a:pPr>
-            <a:r>
-              <a:rPr lang="fr-FR" dirty="0"/>
-              <a:t>Par souci de compatibilité, conservez la JDK </a:t>
-            </a:r>
-            <a:r>
-              <a:rPr lang="fr-FR" dirty="0" smtClean="0"/>
-              <a:t>d’Oracle</a:t>
-            </a:r>
-          </a:p>
-          <a:p>
-            <a:pPr>
-              <a:spcBef>
-                <a:spcPts val="300"/>
-              </a:spcBef>
-              <a:spcAft>
-                <a:spcPts val="300"/>
-              </a:spcAft>
-            </a:pPr>
-            <a:endParaRPr lang="fr-FR" dirty="0"/>
-          </a:p>
-          <a:p>
-            <a:pPr>
-              <a:spcBef>
-                <a:spcPts val="300"/>
-              </a:spcBef>
-              <a:spcAft>
-                <a:spcPts val="300"/>
-              </a:spcAft>
-            </a:pPr>
-            <a:r>
-              <a:rPr lang="fr-FR" b="1" dirty="0"/>
-              <a:t>Alternative à </a:t>
-            </a:r>
-            <a:r>
-              <a:rPr lang="fr-FR" b="1" dirty="0" err="1"/>
-              <a:t>NetBeans</a:t>
-            </a:r>
-            <a:r>
-              <a:rPr lang="fr-FR" b="1" dirty="0"/>
-              <a:t> EE</a:t>
-            </a:r>
-          </a:p>
-          <a:p>
-            <a:pPr>
-              <a:spcBef>
-                <a:spcPts val="300"/>
-              </a:spcBef>
-              <a:spcAft>
-                <a:spcPts val="300"/>
-              </a:spcAft>
-            </a:pPr>
-            <a:r>
-              <a:rPr lang="fr-FR" dirty="0"/>
-              <a:t>Eclipse ou tout autre IDE de </a:t>
-            </a:r>
-            <a:r>
-              <a:rPr lang="fr-FR" dirty="0" smtClean="0"/>
-              <a:t>développement</a:t>
-            </a:r>
-          </a:p>
-          <a:p>
-            <a:pPr>
-              <a:spcBef>
-                <a:spcPts val="300"/>
-              </a:spcBef>
-              <a:spcAft>
-                <a:spcPts val="300"/>
-              </a:spcAft>
-            </a:pPr>
-            <a:endParaRPr lang="fr-FR" dirty="0"/>
-          </a:p>
-          <a:p>
-            <a:pPr>
-              <a:spcBef>
-                <a:spcPts val="300"/>
-              </a:spcBef>
-              <a:spcAft>
-                <a:spcPts val="300"/>
-              </a:spcAft>
-            </a:pPr>
-            <a:r>
-              <a:rPr lang="fr-FR" b="1" dirty="0"/>
-              <a:t>Alternative à </a:t>
-            </a:r>
-            <a:r>
-              <a:rPr lang="fr-FR" b="1" dirty="0" err="1"/>
-              <a:t>GlassFish</a:t>
-            </a:r>
-            <a:endParaRPr lang="fr-FR" b="1" dirty="0"/>
-          </a:p>
-          <a:p>
-            <a:pPr>
-              <a:spcBef>
-                <a:spcPts val="300"/>
-              </a:spcBef>
-              <a:spcAft>
-                <a:spcPts val="300"/>
-              </a:spcAft>
-            </a:pPr>
-            <a:r>
-              <a:rPr lang="fr-FR" dirty="0" err="1"/>
-              <a:t>Tomcat</a:t>
-            </a:r>
-            <a:r>
-              <a:rPr lang="fr-FR" dirty="0"/>
-              <a:t> ou tout autre serveur applicatif supportant Java </a:t>
-            </a:r>
-            <a:r>
-              <a:rPr lang="fr-FR" dirty="0" smtClean="0"/>
-              <a:t>1.8</a:t>
-            </a:r>
-            <a:endParaRPr lang="fr-FR" dirty="0"/>
+            <a:pPr algn="ctr"/>
+            <a:r>
+              <a:rPr lang="fr-FR" sz="4000" dirty="0" smtClean="0"/>
+              <a:t>LE MOT DE LA FIN…</a:t>
+            </a:r>
+            <a:endParaRPr lang="fr-FR" sz="4000" dirty="0"/>
           </a:p>
         </p:txBody>
       </p:sp>
     </p:spTree>
     <p:extLst>
       <p:ext uri="{BB962C8B-B14F-4D97-AF65-F5344CB8AC3E}">
-        <p14:creationId xmlns:p14="http://schemas.microsoft.com/office/powerpoint/2010/main" val="3566518766"/>
+        <p14:creationId xmlns:p14="http://schemas.microsoft.com/office/powerpoint/2010/main" val="1451352722"/>
       </p:ext>
     </p:extLst>
   </p:cSld>
@@ -21639,54 +21381,491 @@
           <a:chExt cx="0" cy="0"/>
         </a:xfrm>
       </p:grpSpPr>
-      <p:sp>
-        <p:nvSpPr>
-          <p:cNvPr id="4" name="ZoneTexte 3"/>
+      <p:pic>
+        <p:nvPicPr>
+          <p:cNvPr id="1026" name="Picture 2" descr="http://www.google.fr/url?source=imglanding&amp;ct=img&amp;q=http://img.clubic.com/05523479-photo-logo-skype.jpg&amp;sa=X&amp;ei=6eJ2Va_FOIGyUrWggYgI&amp;ved=0CAkQ8wc&amp;usg=AFQjCNFwjUn1OuhULWDsziDudvxM-9K4XA"/>
+          <p:cNvPicPr>
+            <a:picLocks noChangeAspect="1" noChangeArrowheads="1"/>
+          </p:cNvPicPr>
+          <p:nvPr/>
+        </p:nvPicPr>
+        <p:blipFill>
+          <a:blip r:embed="rId3" cstate="print">
+            <a:extLst>
+              <a:ext uri="{28A0092B-C50C-407E-A947-70E740481C1C}">
+                <a14:useLocalDpi xmlns:a14="http://schemas.microsoft.com/office/drawing/2010/main" val="0"/>
+              </a:ext>
+            </a:extLst>
+          </a:blip>
+          <a:srcRect/>
+          <a:stretch>
+            <a:fillRect/>
+          </a:stretch>
+        </p:blipFill>
+        <p:spPr bwMode="auto">
+          <a:xfrm>
+            <a:off x="7307922" y="768797"/>
+            <a:ext cx="1063253" cy="1063253"/>
+          </a:xfrm>
+          <a:prstGeom prst="rect">
+            <a:avLst/>
+          </a:prstGeom>
+          <a:noFill/>
+          <a:extLst>
+            <a:ext uri="{909E8E84-426E-40DD-AFC4-6F175D3DCCD1}">
+              <a14:hiddenFill xmlns:a14="http://schemas.microsoft.com/office/drawing/2010/main">
+                <a:solidFill>
+                  <a:srgbClr val="FFFFFF"/>
+                </a:solidFill>
+              </a14:hiddenFill>
+            </a:ext>
+          </a:extLst>
+        </p:spPr>
+      </p:pic>
+      <p:pic>
+        <p:nvPicPr>
+          <p:cNvPr id="1028" name="Picture 4" descr="stinkbug2"/>
+          <p:cNvPicPr>
+            <a:picLocks noChangeAspect="1" noChangeArrowheads="1"/>
+          </p:cNvPicPr>
+          <p:nvPr/>
+        </p:nvPicPr>
+        <p:blipFill>
+          <a:blip r:embed="rId4" cstate="print">
+            <a:extLst>
+              <a:ext uri="{28A0092B-C50C-407E-A947-70E740481C1C}">
+                <a14:useLocalDpi xmlns:a14="http://schemas.microsoft.com/office/drawing/2010/main" val="0"/>
+              </a:ext>
+            </a:extLst>
+          </a:blip>
+          <a:srcRect/>
+          <a:stretch>
+            <a:fillRect/>
+          </a:stretch>
+        </p:blipFill>
+        <p:spPr bwMode="auto">
+          <a:xfrm>
+            <a:off x="7032918" y="5169871"/>
+            <a:ext cx="1613262" cy="1211457"/>
+          </a:xfrm>
+          <a:prstGeom prst="rect">
+            <a:avLst/>
+          </a:prstGeom>
+          <a:noFill/>
+          <a:extLst>
+            <a:ext uri="{909E8E84-426E-40DD-AFC4-6F175D3DCCD1}">
+              <a14:hiddenFill xmlns:a14="http://schemas.microsoft.com/office/drawing/2010/main">
+                <a:solidFill>
+                  <a:srgbClr val="FFFFFF"/>
+                </a:solidFill>
+              </a14:hiddenFill>
+            </a:ext>
+          </a:extLst>
+        </p:spPr>
+      </p:pic>
+      <p:sp>
+        <p:nvSpPr>
+          <p:cNvPr id="8" name="ZoneTexte 7"/>
           <p:cNvSpPr txBox="1"/>
           <p:nvPr/>
         </p:nvSpPr>
         <p:spPr>
           <a:xfrm>
-            <a:off x="1296174" y="2348880"/>
-            <a:ext cx="6984776" cy="707886"/>
+            <a:off x="129238" y="98167"/>
+            <a:ext cx="2282522" cy="369332"/>
           </a:xfrm>
           <a:prstGeom prst="rect">
             <a:avLst/>
           </a:prstGeom>
         </p:spPr>
         <p:style>
-          <a:lnRef idx="0">
+          <a:lnRef idx="1">
             <a:schemeClr val="accent1"/>
           </a:lnRef>
-          <a:fillRef idx="3">
+          <a:fillRef idx="2">
             <a:schemeClr val="accent1"/>
           </a:fillRef>
-          <a:effectRef idx="3">
+          <a:effectRef idx="1">
             <a:schemeClr val="accent1"/>
           </a:effectRef>
           <a:fontRef idx="minor">
-            <a:schemeClr val="lt1"/>
+            <a:schemeClr val="dk1"/>
           </a:fontRef>
         </p:style>
         <p:txBody>
           <a:bodyPr wrap="square" rtlCol="0">
             <a:spAutoFit/>
           </a:bodyPr>
-          <a:lstStyle/>
-          <a:p>
-            <a:pPr algn="ctr"/>
-            <a:r>
-              <a:rPr lang="fr-FR" sz="4000" dirty="0" smtClean="0"/>
-              <a:t>LE MOT DE LA FIN…</a:t>
-            </a:r>
-            <a:endParaRPr lang="fr-FR" sz="4000" dirty="0"/>
-          </a:p>
-        </p:txBody>
-      </p:sp>
+          <a:lstStyle>
+            <a:defPPr>
+              <a:defRPr lang="fr-FR"/>
+            </a:defPPr>
+            <a:lvl1pPr>
+              <a:defRPr>
+                <a:solidFill>
+                  <a:schemeClr val="dk1"/>
+                </a:solidFill>
+              </a:defRPr>
+            </a:lvl1pPr>
+            <a:lvl2pPr>
+              <a:defRPr>
+                <a:solidFill>
+                  <a:schemeClr val="dk1"/>
+                </a:solidFill>
+              </a:defRPr>
+            </a:lvl2pPr>
+            <a:lvl3pPr>
+              <a:defRPr>
+                <a:solidFill>
+                  <a:schemeClr val="dk1"/>
+                </a:solidFill>
+              </a:defRPr>
+            </a:lvl3pPr>
+            <a:lvl4pPr>
+              <a:defRPr>
+                <a:solidFill>
+                  <a:schemeClr val="dk1"/>
+                </a:solidFill>
+              </a:defRPr>
+            </a:lvl4pPr>
+            <a:lvl5pPr>
+              <a:defRPr>
+                <a:solidFill>
+                  <a:schemeClr val="dk1"/>
+                </a:solidFill>
+              </a:defRPr>
+            </a:lvl5pPr>
+            <a:lvl6pPr>
+              <a:defRPr>
+                <a:solidFill>
+                  <a:schemeClr val="dk1"/>
+                </a:solidFill>
+              </a:defRPr>
+            </a:lvl6pPr>
+            <a:lvl7pPr>
+              <a:defRPr>
+                <a:solidFill>
+                  <a:schemeClr val="dk1"/>
+                </a:solidFill>
+              </a:defRPr>
+            </a:lvl7pPr>
+            <a:lvl8pPr>
+              <a:defRPr>
+                <a:solidFill>
+                  <a:schemeClr val="dk1"/>
+                </a:solidFill>
+              </a:defRPr>
+            </a:lvl8pPr>
+            <a:lvl9pPr>
+              <a:defRPr>
+                <a:solidFill>
+                  <a:schemeClr val="dk1"/>
+                </a:solidFill>
+              </a:defRPr>
+            </a:lvl9pPr>
+          </a:lstStyle>
+          <a:p>
+            <a:r>
+              <a:rPr lang="fr-FR" dirty="0" smtClean="0"/>
+              <a:t>Côté communication</a:t>
+            </a:r>
+            <a:endParaRPr lang="fr-FR" dirty="0"/>
+          </a:p>
+        </p:txBody>
+      </p:sp>
+      <p:sp>
+        <p:nvSpPr>
+          <p:cNvPr id="3" name="Rectangle 2"/>
+          <p:cNvSpPr/>
+          <p:nvPr/>
+        </p:nvSpPr>
+        <p:spPr>
+          <a:xfrm>
+            <a:off x="302970" y="692696"/>
+            <a:ext cx="6933326" cy="1354217"/>
+          </a:xfrm>
+          <a:prstGeom prst="rect">
+            <a:avLst/>
+          </a:prstGeom>
+        </p:spPr>
+        <p:txBody>
+          <a:bodyPr wrap="square">
+            <a:spAutoFit/>
+          </a:bodyPr>
+          <a:lstStyle/>
+          <a:p>
+            <a:pPr>
+              <a:spcBef>
+                <a:spcPts val="300"/>
+              </a:spcBef>
+              <a:spcAft>
+                <a:spcPts val="300"/>
+              </a:spcAft>
+            </a:pPr>
+            <a:r>
+              <a:rPr lang="fr-FR" b="1" dirty="0"/>
+              <a:t>Communication d’équipe</a:t>
+            </a:r>
+          </a:p>
+          <a:p>
+            <a:pPr>
+              <a:spcBef>
+                <a:spcPts val="300"/>
+              </a:spcBef>
+              <a:spcAft>
+                <a:spcPts val="300"/>
+              </a:spcAft>
+            </a:pPr>
+            <a:r>
+              <a:rPr lang="fr-FR" dirty="0"/>
+              <a:t>Nous allons </a:t>
+            </a:r>
+            <a:r>
+              <a:rPr lang="fr-FR" dirty="0" smtClean="0"/>
+              <a:t>privilégier </a:t>
+            </a:r>
+            <a:r>
+              <a:rPr lang="fr-FR" dirty="0"/>
+              <a:t>SKYPE pour </a:t>
+            </a:r>
+            <a:r>
+              <a:rPr lang="fr-FR" dirty="0" smtClean="0"/>
+              <a:t>les visio-conférences hebdomadaires</a:t>
+            </a:r>
+          </a:p>
+          <a:p>
+            <a:pPr>
+              <a:spcBef>
+                <a:spcPts val="300"/>
+              </a:spcBef>
+              <a:spcAft>
+                <a:spcPts val="300"/>
+              </a:spcAft>
+            </a:pPr>
+            <a:r>
+              <a:rPr lang="fr-FR" dirty="0" smtClean="0"/>
+              <a:t>Entre-temps, vous </a:t>
+            </a:r>
+            <a:r>
+              <a:rPr lang="fr-FR" dirty="0"/>
+              <a:t>pouvez m’envoyer un mail à </a:t>
+            </a:r>
+            <a:r>
+              <a:rPr lang="fr-FR" u="sng" dirty="0" err="1">
+                <a:solidFill>
+                  <a:schemeClr val="tx2"/>
+                </a:solidFill>
+              </a:rPr>
+              <a:t>olivier.essner</a:t>
+            </a:r>
+            <a:r>
+              <a:rPr lang="fr-FR" u="sng" dirty="0">
+                <a:solidFill>
+                  <a:schemeClr val="tx2"/>
+                </a:solidFill>
+              </a:rPr>
+              <a:t> (at) </a:t>
+            </a:r>
+            <a:r>
+              <a:rPr lang="fr-FR" u="sng" dirty="0" smtClean="0">
+                <a:solidFill>
+                  <a:schemeClr val="tx2"/>
+                </a:solidFill>
+              </a:rPr>
+              <a:t>free.fr </a:t>
+            </a:r>
+            <a:r>
+              <a:rPr lang="fr-FR" dirty="0" smtClean="0"/>
+              <a:t>Penser à mettre tout le monde en copie des échanges de mails ! </a:t>
+            </a:r>
+            <a:endParaRPr lang="fr-FR" dirty="0"/>
+          </a:p>
+        </p:txBody>
+      </p:sp>
+      <p:sp>
+        <p:nvSpPr>
+          <p:cNvPr id="4" name="Rectangle 3"/>
+          <p:cNvSpPr/>
+          <p:nvPr/>
+        </p:nvSpPr>
+        <p:spPr>
+          <a:xfrm>
+            <a:off x="4572000" y="2738824"/>
+            <a:ext cx="4572000" cy="1554272"/>
+          </a:xfrm>
+          <a:prstGeom prst="rect">
+            <a:avLst/>
+          </a:prstGeom>
+        </p:spPr>
+        <p:txBody>
+          <a:bodyPr>
+            <a:spAutoFit/>
+          </a:bodyPr>
+          <a:lstStyle/>
+          <a:p>
+            <a:pPr>
+              <a:spcBef>
+                <a:spcPts val="300"/>
+              </a:spcBef>
+              <a:spcAft>
+                <a:spcPts val="300"/>
+              </a:spcAft>
+            </a:pPr>
+            <a:r>
+              <a:rPr lang="fr-FR" b="1" dirty="0" err="1" smtClean="0"/>
+              <a:t>Keep</a:t>
+            </a:r>
+            <a:r>
+              <a:rPr lang="fr-FR" b="1" dirty="0" smtClean="0"/>
+              <a:t> </a:t>
+            </a:r>
+            <a:r>
+              <a:rPr lang="fr-FR" b="1" dirty="0" err="1" smtClean="0"/>
+              <a:t>it</a:t>
+            </a:r>
+            <a:r>
+              <a:rPr lang="fr-FR" b="1" dirty="0" smtClean="0"/>
+              <a:t> simple </a:t>
+            </a:r>
+            <a:r>
+              <a:rPr lang="fr-FR" b="1" dirty="0"/>
+              <a:t>!</a:t>
+            </a:r>
+          </a:p>
+          <a:p>
+            <a:pPr>
+              <a:spcBef>
+                <a:spcPts val="300"/>
+              </a:spcBef>
+              <a:spcAft>
+                <a:spcPts val="300"/>
+              </a:spcAft>
+            </a:pPr>
+            <a:r>
+              <a:rPr lang="fr-FR" dirty="0"/>
+              <a:t>En 3 mois de travail, les enseignants du Master ne nous demandent pas un projet « techniquement  parfait  » mais « un projet qui marche </a:t>
+            </a:r>
+            <a:r>
+              <a:rPr lang="fr-FR" dirty="0" smtClean="0"/>
+              <a:t>»…</a:t>
+            </a:r>
+            <a:endParaRPr lang="fr-FR" dirty="0"/>
+          </a:p>
+        </p:txBody>
+      </p:sp>
+      <p:sp>
+        <p:nvSpPr>
+          <p:cNvPr id="5" name="Rectangle 4"/>
+          <p:cNvSpPr/>
+          <p:nvPr/>
+        </p:nvSpPr>
+        <p:spPr>
+          <a:xfrm>
+            <a:off x="323528" y="5104055"/>
+            <a:ext cx="6709390" cy="1277273"/>
+          </a:xfrm>
+          <a:prstGeom prst="rect">
+            <a:avLst/>
+          </a:prstGeom>
+        </p:spPr>
+        <p:txBody>
+          <a:bodyPr wrap="square">
+            <a:spAutoFit/>
+          </a:bodyPr>
+          <a:lstStyle/>
+          <a:p>
+            <a:pPr>
+              <a:spcBef>
+                <a:spcPts val="300"/>
+              </a:spcBef>
+              <a:spcAft>
+                <a:spcPts val="300"/>
+              </a:spcAft>
+            </a:pPr>
+            <a:r>
+              <a:rPr lang="fr-FR" b="1" dirty="0"/>
+              <a:t>En cas de blocage ou de bug récalcitrant</a:t>
+            </a:r>
+          </a:p>
+          <a:p>
+            <a:pPr>
+              <a:spcBef>
+                <a:spcPts val="300"/>
+              </a:spcBef>
+              <a:spcAft>
+                <a:spcPts val="300"/>
+              </a:spcAft>
+            </a:pPr>
+            <a:r>
+              <a:rPr lang="fr-FR" dirty="0"/>
+              <a:t>N’hésitez pas à demander de l’aide aux autres membres de notre équipe. Nos compétences &amp; expériences pro sont variées, il est donc très probable que l’un d’entre nous ai déjà votre solution </a:t>
+            </a:r>
+            <a:r>
+              <a:rPr lang="fr-FR" dirty="0" smtClean="0"/>
+              <a:t>!</a:t>
+            </a:r>
+            <a:endParaRPr lang="fr-FR" dirty="0"/>
+          </a:p>
+        </p:txBody>
+      </p:sp>
+      <p:pic>
+        <p:nvPicPr>
+          <p:cNvPr id="1030" name="Picture 6"/>
+          <p:cNvPicPr>
+            <a:picLocks noChangeAspect="1" noChangeArrowheads="1"/>
+          </p:cNvPicPr>
+          <p:nvPr/>
+        </p:nvPicPr>
+        <p:blipFill>
+          <a:blip r:embed="rId5">
+            <a:extLst>
+              <a:ext uri="{28A0092B-C50C-407E-A947-70E740481C1C}">
+                <a14:useLocalDpi xmlns:a14="http://schemas.microsoft.com/office/drawing/2010/main" val="0"/>
+              </a:ext>
+            </a:extLst>
+          </a:blip>
+          <a:srcRect/>
+          <a:stretch>
+            <a:fillRect/>
+          </a:stretch>
+        </p:blipFill>
+        <p:spPr bwMode="auto">
+          <a:xfrm>
+            <a:off x="379884" y="2239543"/>
+            <a:ext cx="4120108" cy="2557609"/>
+          </a:xfrm>
+          <a:prstGeom prst="rect">
+            <a:avLst/>
+          </a:prstGeom>
+          <a:noFill/>
+          <a:ln>
+            <a:noFill/>
+          </a:ln>
+          <a:extLst>
+            <a:ext uri="{909E8E84-426E-40DD-AFC4-6F175D3DCCD1}">
+              <a14:hiddenFill xmlns:a14="http://schemas.microsoft.com/office/drawing/2010/main">
+                <a:solidFill>
+                  <a:schemeClr val="accent1"/>
+                </a:solidFill>
+              </a14:hiddenFill>
+            </a:ext>
+            <a:ext uri="{91240B29-F687-4F45-9708-019B960494DF}">
+              <a14:hiddenLine xmlns:a14="http://schemas.microsoft.com/office/drawing/2010/main" w="9525">
+                <a:solidFill>
+                  <a:schemeClr val="tx1"/>
+                </a:solidFill>
+                <a:miter lim="800000"/>
+                <a:headEnd/>
+                <a:tailEnd/>
+              </a14:hiddenLine>
+            </a:ext>
+          </a:extLst>
+        </p:spPr>
+      </p:pic>
     </p:spTree>
     <p:extLst>
       <p:ext uri="{BB962C8B-B14F-4D97-AF65-F5344CB8AC3E}">
-        <p14:creationId xmlns:p14="http://schemas.microsoft.com/office/powerpoint/2010/main" val="1451352722"/>
+        <p14:creationId xmlns:p14="http://schemas.microsoft.com/office/powerpoint/2010/main" val="1381163136"/>
       </p:ext>
     </p:extLst>
   </p:cSld>
@@ -21720,16 +21899,89 @@
           <a:chExt cx="0" cy="0"/>
         </a:xfrm>
       </p:grpSpPr>
+      <p:sp>
+        <p:nvSpPr>
+          <p:cNvPr id="4" name="ZoneTexte 3"/>
+          <p:cNvSpPr txBox="1"/>
+          <p:nvPr/>
+        </p:nvSpPr>
+        <p:spPr>
+          <a:xfrm>
+            <a:off x="1296174" y="2348880"/>
+            <a:ext cx="6984776" cy="1323439"/>
+          </a:xfrm>
+          <a:prstGeom prst="rect">
+            <a:avLst/>
+          </a:prstGeom>
+        </p:spPr>
+        <p:style>
+          <a:lnRef idx="0">
+            <a:schemeClr val="accent1"/>
+          </a:lnRef>
+          <a:fillRef idx="3">
+            <a:schemeClr val="accent1"/>
+          </a:fillRef>
+          <a:effectRef idx="3">
+            <a:schemeClr val="accent1"/>
+          </a:effectRef>
+          <a:fontRef idx="minor">
+            <a:schemeClr val="lt1"/>
+          </a:fontRef>
+        </p:style>
+        <p:txBody>
+          <a:bodyPr wrap="square" rtlCol="0">
+            <a:spAutoFit/>
+          </a:bodyPr>
+          <a:lstStyle/>
+          <a:p>
+            <a:pPr algn="ctr"/>
+            <a:r>
+              <a:rPr lang="fr-FR" sz="4000" dirty="0" smtClean="0"/>
+              <a:t>Début du projet le lundi 22/06/2015</a:t>
+            </a:r>
+            <a:endParaRPr lang="fr-FR" sz="4000" dirty="0"/>
+          </a:p>
+        </p:txBody>
+      </p:sp>
+      <p:sp>
+        <p:nvSpPr>
+          <p:cNvPr id="3" name="Rectangle 2"/>
+          <p:cNvSpPr/>
+          <p:nvPr/>
+        </p:nvSpPr>
+        <p:spPr>
+          <a:xfrm>
+            <a:off x="2315153" y="4365104"/>
+            <a:ext cx="4946818" cy="369332"/>
+          </a:xfrm>
+          <a:prstGeom prst="rect">
+            <a:avLst/>
+          </a:prstGeom>
+        </p:spPr>
+        <p:txBody>
+          <a:bodyPr wrap="square">
+            <a:spAutoFit/>
+          </a:bodyPr>
+          <a:lstStyle/>
+          <a:p>
+            <a:r>
+              <a:rPr lang="fr-FR" b="1" dirty="0" smtClean="0"/>
+              <a:t>D’ici là, bonne chance pour les examens de Juin !</a:t>
+            </a:r>
+            <a:endParaRPr lang="fr-FR" dirty="0" smtClean="0"/>
+          </a:p>
+        </p:txBody>
+      </p:sp>
       <p:pic>
         <p:nvPicPr>
-          <p:cNvPr id="1026" name="Picture 2" descr="http://www.google.fr/url?source=imglanding&amp;ct=img&amp;q=http://img.clubic.com/05523479-photo-logo-skype.jpg&amp;sa=X&amp;ei=6eJ2Va_FOIGyUrWggYgI&amp;ved=0CAkQ8wc&amp;usg=AFQjCNFwjUn1OuhULWDsziDudvxM-9K4XA"/>
+          <p:cNvPr id="2050" name="Picture 2" descr="http://www.google.fr/url?source=imglanding&amp;ct=img&amp;q=http://www.michel-vaillant.com/upload/content/photo116_399.jpg&amp;sa=X&amp;ei=q-Z2VZ7nNcvSUevMgIAM&amp;ved=0CAkQ8wc&amp;usg=AFQjCNHFgmCGio-hujBTxCHvB0YLGczseA"/>
           <p:cNvPicPr>
             <a:picLocks noChangeAspect="1" noChangeArrowheads="1"/>
           </p:cNvPicPr>
           <p:nvPr/>
         </p:nvPicPr>
         <p:blipFill>
-          <a:blip r:embed="rId3" cstate="print">
+          <a:blip r:embed="rId3">
             <a:extLst>
               <a:ext uri="{28A0092B-C50C-407E-A947-70E740481C1C}">
                 <a14:useLocalDpi xmlns:a14="http://schemas.microsoft.com/office/drawing/2010/main" val="0"/>
@@ -21743,8 +21995,8 @@
         </p:blipFill>
         <p:spPr bwMode="auto">
           <a:xfrm>
-            <a:off x="7307922" y="768797"/>
-            <a:ext cx="1063253" cy="1063253"/>
+            <a:off x="220106" y="4077072"/>
+            <a:ext cx="1681847" cy="1655361"/>
           </a:xfrm>
           <a:prstGeom prst="rect">
             <a:avLst/>
@@ -21761,16 +22013,55 @@
           </a:extLst>
         </p:spPr>
       </p:pic>
+      <p:sp>
+        <p:nvSpPr>
+          <p:cNvPr id="2" name="AutoShape 4"/>
+          <p:cNvSpPr>
+            <a:spLocks noChangeAspect="1" noChangeArrowheads="1"/>
+          </p:cNvSpPr>
+          <p:nvPr/>
+        </p:nvSpPr>
+        <p:spPr bwMode="auto">
+          <a:xfrm>
+            <a:off x="63500" y="-136525"/>
+            <a:ext cx="2143125" cy="2143125"/>
+          </a:xfrm>
+          <a:prstGeom prst="rect">
+            <a:avLst/>
+          </a:prstGeom>
+          <a:noFill/>
+          <a:extLst>
+            <a:ext uri="{909E8E84-426E-40DD-AFC4-6F175D3DCCD1}">
+              <a14:hiddenFill xmlns:a14="http://schemas.microsoft.com/office/drawing/2010/main">
+                <a:solidFill>
+                  <a:srgbClr val="FFFFFF"/>
+                </a:solidFill>
+              </a14:hiddenFill>
+            </a:ext>
+          </a:extLst>
+        </p:spPr>
+        <p:txBody>
+          <a:bodyPr vert="horz" wrap="square" lIns="91440" tIns="45720" rIns="91440" bIns="45720" numCol="1" anchor="t" anchorCtr="0" compatLnSpc="1">
+            <a:prstTxWarp prst="textNoShape">
+              <a:avLst/>
+            </a:prstTxWarp>
+          </a:bodyPr>
+          <a:lstStyle/>
+          <a:p>
+            <a:endParaRPr lang="fr-FR"/>
+          </a:p>
+        </p:txBody>
+      </p:sp>
       <p:pic>
         <p:nvPicPr>
-          <p:cNvPr id="1028" name="Picture 4" descr="stinkbug2"/>
+          <p:cNvPr id="2054" name="Picture 6" descr="http://www.google.fr/url?source=imglanding&amp;ct=img&amp;q=http://ekladata.com/YKU_jsvfwxIZQ1YuqO-wR9wcIgc.jpg&amp;sa=X&amp;ei=2-Z2VcOBGMn5UIWwgugG&amp;ved=0CAkQ8wc&amp;usg=AFQjCNGS6MN2WXzseH5fPJnsyY-kAJjhlg"/>
           <p:cNvPicPr>
             <a:picLocks noChangeAspect="1" noChangeArrowheads="1"/>
           </p:cNvPicPr>
           <p:nvPr/>
         </p:nvPicPr>
         <p:blipFill>
-          <a:blip r:embed="rId4" cstate="print">
+          <a:blip r:embed="rId4">
             <a:extLst>
               <a:ext uri="{28A0092B-C50C-407E-A947-70E740481C1C}">
                 <a14:useLocalDpi xmlns:a14="http://schemas.microsoft.com/office/drawing/2010/main" val="0"/>
@@ -21784,8 +22075,8 @@
         </p:blipFill>
         <p:spPr bwMode="auto">
           <a:xfrm>
-            <a:off x="7032918" y="5169871"/>
-            <a:ext cx="1613262" cy="1211457"/>
+            <a:off x="7331186" y="4190377"/>
+            <a:ext cx="1428750" cy="1428750"/>
           </a:xfrm>
           <a:prstGeom prst="rect">
             <a:avLst/>
@@ -21802,409 +22093,10 @@
           </a:extLst>
         </p:spPr>
       </p:pic>
-      <p:sp>
-        <p:nvSpPr>
-          <p:cNvPr id="8" name="ZoneTexte 7"/>
-          <p:cNvSpPr txBox="1"/>
-          <p:nvPr/>
-        </p:nvSpPr>
-        <p:spPr>
-          <a:xfrm>
-            <a:off x="129238" y="98167"/>
-            <a:ext cx="2282522" cy="369332"/>
-          </a:xfrm>
-          <a:prstGeom prst="rect">
-            <a:avLst/>
-          </a:prstGeom>
-        </p:spPr>
-        <p:style>
-          <a:lnRef idx="1">
-            <a:schemeClr val="accent1"/>
-          </a:lnRef>
-          <a:fillRef idx="2">
-            <a:schemeClr val="accent1"/>
-          </a:fillRef>
-          <a:effectRef idx="1">
-            <a:schemeClr val="accent1"/>
-          </a:effectRef>
-          <a:fontRef idx="minor">
-            <a:schemeClr val="dk1"/>
-          </a:fontRef>
-        </p:style>
-        <p:txBody>
-          <a:bodyPr wrap="square" rtlCol="0">
-            <a:spAutoFit/>
-          </a:bodyPr>
-          <a:lstStyle>
-            <a:defPPr>
-              <a:defRPr lang="fr-FR"/>
-            </a:defPPr>
-            <a:lvl1pPr>
-              <a:defRPr>
-                <a:solidFill>
-                  <a:schemeClr val="dk1"/>
-                </a:solidFill>
-              </a:defRPr>
-            </a:lvl1pPr>
-            <a:lvl2pPr>
-              <a:defRPr>
-                <a:solidFill>
-                  <a:schemeClr val="dk1"/>
-                </a:solidFill>
-              </a:defRPr>
-            </a:lvl2pPr>
-            <a:lvl3pPr>
-              <a:defRPr>
-                <a:solidFill>
-                  <a:schemeClr val="dk1"/>
-                </a:solidFill>
-              </a:defRPr>
-            </a:lvl3pPr>
-            <a:lvl4pPr>
-              <a:defRPr>
-                <a:solidFill>
-                  <a:schemeClr val="dk1"/>
-                </a:solidFill>
-              </a:defRPr>
-            </a:lvl4pPr>
-            <a:lvl5pPr>
-              <a:defRPr>
-                <a:solidFill>
-                  <a:schemeClr val="dk1"/>
-                </a:solidFill>
-              </a:defRPr>
-            </a:lvl5pPr>
-            <a:lvl6pPr>
-              <a:defRPr>
-                <a:solidFill>
-                  <a:schemeClr val="dk1"/>
-                </a:solidFill>
-              </a:defRPr>
-            </a:lvl6pPr>
-            <a:lvl7pPr>
-              <a:defRPr>
-                <a:solidFill>
-                  <a:schemeClr val="dk1"/>
-                </a:solidFill>
-              </a:defRPr>
-            </a:lvl7pPr>
-            <a:lvl8pPr>
-              <a:defRPr>
-                <a:solidFill>
-                  <a:schemeClr val="dk1"/>
-                </a:solidFill>
-              </a:defRPr>
-            </a:lvl8pPr>
-            <a:lvl9pPr>
-              <a:defRPr>
-                <a:solidFill>
-                  <a:schemeClr val="dk1"/>
-                </a:solidFill>
-              </a:defRPr>
-            </a:lvl9pPr>
-          </a:lstStyle>
-          <a:p>
-            <a:r>
-              <a:rPr lang="fr-FR" dirty="0" smtClean="0"/>
-              <a:t>Côté communication</a:t>
-            </a:r>
-            <a:endParaRPr lang="fr-FR" dirty="0"/>
-          </a:p>
-        </p:txBody>
-      </p:sp>
-      <p:sp>
-        <p:nvSpPr>
-          <p:cNvPr id="3" name="Rectangle 2"/>
-          <p:cNvSpPr/>
-          <p:nvPr/>
-        </p:nvSpPr>
-        <p:spPr>
-          <a:xfrm>
-            <a:off x="302970" y="692696"/>
-            <a:ext cx="6933326" cy="1354217"/>
-          </a:xfrm>
-          <a:prstGeom prst="rect">
-            <a:avLst/>
-          </a:prstGeom>
-        </p:spPr>
-        <p:txBody>
-          <a:bodyPr wrap="square">
-            <a:spAutoFit/>
-          </a:bodyPr>
-          <a:lstStyle/>
-          <a:p>
-            <a:pPr>
-              <a:spcBef>
-                <a:spcPts val="300"/>
-              </a:spcBef>
-              <a:spcAft>
-                <a:spcPts val="300"/>
-              </a:spcAft>
-            </a:pPr>
-            <a:r>
-              <a:rPr lang="fr-FR" b="1" dirty="0"/>
-              <a:t>Communication d’équipe</a:t>
-            </a:r>
-          </a:p>
-          <a:p>
-            <a:pPr>
-              <a:spcBef>
-                <a:spcPts val="300"/>
-              </a:spcBef>
-              <a:spcAft>
-                <a:spcPts val="300"/>
-              </a:spcAft>
-            </a:pPr>
-            <a:r>
-              <a:rPr lang="fr-FR" dirty="0"/>
-              <a:t>Nous allons </a:t>
-            </a:r>
-            <a:r>
-              <a:rPr lang="fr-FR" dirty="0" smtClean="0"/>
-              <a:t>privilégier </a:t>
-            </a:r>
-            <a:r>
-              <a:rPr lang="fr-FR" dirty="0"/>
-              <a:t>SKYPE pour </a:t>
-            </a:r>
-            <a:r>
-              <a:rPr lang="fr-FR" dirty="0" smtClean="0"/>
-              <a:t>les visio-conférences hebdomadaires</a:t>
-            </a:r>
-          </a:p>
-          <a:p>
-            <a:pPr>
-              <a:spcBef>
-                <a:spcPts val="300"/>
-              </a:spcBef>
-              <a:spcAft>
-                <a:spcPts val="300"/>
-              </a:spcAft>
-            </a:pPr>
-            <a:r>
-              <a:rPr lang="fr-FR" dirty="0" smtClean="0"/>
-              <a:t>Entre-temps, vous </a:t>
-            </a:r>
-            <a:r>
-              <a:rPr lang="fr-FR" dirty="0"/>
-              <a:t>pouvez m’envoyer un mail à </a:t>
-            </a:r>
-            <a:r>
-              <a:rPr lang="fr-FR" u="sng" dirty="0" err="1">
-                <a:solidFill>
-                  <a:schemeClr val="tx2"/>
-                </a:solidFill>
-              </a:rPr>
-              <a:t>olivier.essner</a:t>
-            </a:r>
-            <a:r>
-              <a:rPr lang="fr-FR" u="sng" dirty="0">
-                <a:solidFill>
-                  <a:schemeClr val="tx2"/>
-                </a:solidFill>
-              </a:rPr>
-              <a:t> (at) </a:t>
-            </a:r>
-            <a:r>
-              <a:rPr lang="fr-FR" u="sng" dirty="0" smtClean="0">
-                <a:solidFill>
-                  <a:schemeClr val="tx2"/>
-                </a:solidFill>
-              </a:rPr>
-              <a:t>free.fr </a:t>
-            </a:r>
-            <a:r>
-              <a:rPr lang="fr-FR" dirty="0" smtClean="0"/>
-              <a:t>Penser à mettre tout le monde en copie des échanges de mails ! </a:t>
-            </a:r>
-            <a:endParaRPr lang="fr-FR" dirty="0"/>
-          </a:p>
-        </p:txBody>
-      </p:sp>
-      <p:sp>
-        <p:nvSpPr>
-          <p:cNvPr id="4" name="Rectangle 3"/>
-          <p:cNvSpPr/>
-          <p:nvPr/>
-        </p:nvSpPr>
-        <p:spPr>
-          <a:xfrm>
-            <a:off x="4572000" y="2738824"/>
-            <a:ext cx="4572000" cy="1554272"/>
-          </a:xfrm>
-          <a:prstGeom prst="rect">
-            <a:avLst/>
-          </a:prstGeom>
-        </p:spPr>
-        <p:txBody>
-          <a:bodyPr>
-            <a:spAutoFit/>
-          </a:bodyPr>
-          <a:lstStyle/>
-          <a:p>
-            <a:pPr>
-              <a:spcBef>
-                <a:spcPts val="300"/>
-              </a:spcBef>
-              <a:spcAft>
-                <a:spcPts val="300"/>
-              </a:spcAft>
-            </a:pPr>
-            <a:r>
-              <a:rPr lang="fr-FR" b="1" dirty="0" err="1" smtClean="0"/>
-              <a:t>Keep</a:t>
-            </a:r>
-            <a:r>
-              <a:rPr lang="fr-FR" b="1" dirty="0" smtClean="0"/>
-              <a:t> </a:t>
-            </a:r>
-            <a:r>
-              <a:rPr lang="fr-FR" b="1" dirty="0" err="1" smtClean="0"/>
-              <a:t>it</a:t>
-            </a:r>
-            <a:r>
-              <a:rPr lang="fr-FR" b="1" dirty="0" smtClean="0"/>
-              <a:t> simple </a:t>
-            </a:r>
-            <a:r>
-              <a:rPr lang="fr-FR" b="1" dirty="0"/>
-              <a:t>!</a:t>
-            </a:r>
-          </a:p>
-          <a:p>
-            <a:pPr>
-              <a:spcBef>
-                <a:spcPts val="300"/>
-              </a:spcBef>
-              <a:spcAft>
-                <a:spcPts val="300"/>
-              </a:spcAft>
-            </a:pPr>
-            <a:r>
-              <a:rPr lang="fr-FR" dirty="0"/>
-              <a:t>En 3 mois de travail, les enseignants du Master ne nous demandent pas un projet « techniquement  parfait  » mais « un projet qui marche </a:t>
-            </a:r>
-            <a:r>
-              <a:rPr lang="fr-FR" dirty="0" smtClean="0"/>
-              <a:t>»…</a:t>
-            </a:r>
-            <a:endParaRPr lang="fr-FR" dirty="0"/>
-          </a:p>
-        </p:txBody>
-      </p:sp>
-      <p:sp>
-        <p:nvSpPr>
-          <p:cNvPr id="5" name="Rectangle 4"/>
-          <p:cNvSpPr/>
-          <p:nvPr/>
-        </p:nvSpPr>
-        <p:spPr>
-          <a:xfrm>
-            <a:off x="323528" y="5104055"/>
-            <a:ext cx="6709390" cy="1277273"/>
-          </a:xfrm>
-          <a:prstGeom prst="rect">
-            <a:avLst/>
-          </a:prstGeom>
-        </p:spPr>
-        <p:txBody>
-          <a:bodyPr wrap="square">
-            <a:spAutoFit/>
-          </a:bodyPr>
-          <a:lstStyle/>
-          <a:p>
-            <a:pPr>
-              <a:spcBef>
-                <a:spcPts val="300"/>
-              </a:spcBef>
-              <a:spcAft>
-                <a:spcPts val="300"/>
-              </a:spcAft>
-            </a:pPr>
-            <a:r>
-              <a:rPr lang="fr-FR" b="1" dirty="0"/>
-              <a:t>En cas de blocage ou de bug récalcitrant</a:t>
-            </a:r>
-          </a:p>
-          <a:p>
-            <a:pPr>
-              <a:spcBef>
-                <a:spcPts val="300"/>
-              </a:spcBef>
-              <a:spcAft>
-                <a:spcPts val="300"/>
-              </a:spcAft>
-            </a:pPr>
-            <a:r>
-              <a:rPr lang="fr-FR" dirty="0"/>
-              <a:t>N’hésitez pas à demander de l’aide aux autres membres de notre équipe. Nos compétences &amp; expériences pro sont variées, il est donc très probable que l’un d’entre nous ai déjà votre solution </a:t>
-            </a:r>
-            <a:r>
-              <a:rPr lang="fr-FR" dirty="0" smtClean="0"/>
-              <a:t>!</a:t>
-            </a:r>
-            <a:endParaRPr lang="fr-FR" dirty="0"/>
-          </a:p>
-        </p:txBody>
-      </p:sp>
-      <p:pic>
-        <p:nvPicPr>
-          <p:cNvPr id="1030" name="Picture 6"/>
-          <p:cNvPicPr>
-            <a:picLocks noChangeAspect="1" noChangeArrowheads="1"/>
-          </p:cNvPicPr>
-          <p:nvPr/>
-        </p:nvPicPr>
-        <p:blipFill>
-          <a:blip r:embed="rId5">
-            <a:extLst>
-              <a:ext uri="{28A0092B-C50C-407E-A947-70E740481C1C}">
-                <a14:useLocalDpi xmlns:a14="http://schemas.microsoft.com/office/drawing/2010/main" val="0"/>
-              </a:ext>
-            </a:extLst>
-          </a:blip>
-          <a:srcRect/>
-          <a:stretch>
-            <a:fillRect/>
-          </a:stretch>
-        </p:blipFill>
-        <p:spPr bwMode="auto">
-          <a:xfrm>
-            <a:off x="379884" y="2239543"/>
-            <a:ext cx="4120108" cy="2557609"/>
-          </a:xfrm>
-          <a:prstGeom prst="rect">
-            <a:avLst/>
-          </a:prstGeom>
-          <a:noFill/>
-          <a:ln>
-            <a:noFill/>
-          </a:ln>
-          <a:extLst>
-            <a:ext uri="{909E8E84-426E-40DD-AFC4-6F175D3DCCD1}">
-              <a14:hiddenFill xmlns:a14="http://schemas.microsoft.com/office/drawing/2010/main">
-                <a:solidFill>
-                  <a:schemeClr val="accent1"/>
-                </a:solidFill>
-              </a14:hiddenFill>
-            </a:ext>
-            <a:ext uri="{91240B29-F687-4F45-9708-019B960494DF}">
-              <a14:hiddenLine xmlns:a14="http://schemas.microsoft.com/office/drawing/2010/main" w="9525">
-                <a:solidFill>
-                  <a:schemeClr val="tx1"/>
-                </a:solidFill>
-                <a:miter lim="800000"/>
-                <a:headEnd/>
-                <a:tailEnd/>
-              </a14:hiddenLine>
-            </a:ext>
-          </a:extLst>
-        </p:spPr>
-      </p:pic>
     </p:spTree>
     <p:extLst>
       <p:ext uri="{BB962C8B-B14F-4D97-AF65-F5344CB8AC3E}">
-        <p14:creationId xmlns:p14="http://schemas.microsoft.com/office/powerpoint/2010/main" val="1381163136"/>
+        <p14:creationId xmlns:p14="http://schemas.microsoft.com/office/powerpoint/2010/main" val="4022729328"/>
       </p:ext>
     </p:extLst>
   </p:cSld>
@@ -22678,237 +22570,6 @@
     <p:extLst>
       <p:ext uri="{BB962C8B-B14F-4D97-AF65-F5344CB8AC3E}">
         <p14:creationId xmlns:p14="http://schemas.microsoft.com/office/powerpoint/2010/main" val="855887681"/>
-      </p:ext>
-    </p:extLst>
-  </p:cSld>
-  <p:clrMapOvr>
-    <a:masterClrMapping/>
-  </p:clrMapOvr>
-  <p:timing>
-    <p:tnLst>
-      <p:par>
-        <p:cTn id="1" dur="indefinite" restart="never" nodeType="tmRoot"/>
-      </p:par>
-    </p:tnLst>
-  </p:timing>
-</p:sld>
-</file>
-
-<file path=ppt/slides/slide40.xml><?xml version="1.0" encoding="utf-8"?>
-<p:sld xmlns:a="http://schemas.openxmlformats.org/drawingml/2006/main" xmlns:r="http://schemas.openxmlformats.org/officeDocument/2006/relationships" xmlns:p="http://schemas.openxmlformats.org/presentationml/2006/main">
-  <p:cSld>
-    <p:spTree>
-      <p:nvGrpSpPr>
-        <p:cNvPr id="1" name=""/>
-        <p:cNvGrpSpPr/>
-        <p:nvPr/>
-      </p:nvGrpSpPr>
-      <p:grpSpPr>
-        <a:xfrm>
-          <a:off x="0" y="0"/>
-          <a:ext cx="0" cy="0"/>
-          <a:chOff x="0" y="0"/>
-          <a:chExt cx="0" cy="0"/>
-        </a:xfrm>
-      </p:grpSpPr>
-      <p:sp>
-        <p:nvSpPr>
-          <p:cNvPr id="4" name="ZoneTexte 3"/>
-          <p:cNvSpPr txBox="1"/>
-          <p:nvPr/>
-        </p:nvSpPr>
-        <p:spPr>
-          <a:xfrm>
-            <a:off x="1296174" y="2348880"/>
-            <a:ext cx="6984776" cy="1323439"/>
-          </a:xfrm>
-          <a:prstGeom prst="rect">
-            <a:avLst/>
-          </a:prstGeom>
-        </p:spPr>
-        <p:style>
-          <a:lnRef idx="0">
-            <a:schemeClr val="accent1"/>
-          </a:lnRef>
-          <a:fillRef idx="3">
-            <a:schemeClr val="accent1"/>
-          </a:fillRef>
-          <a:effectRef idx="3">
-            <a:schemeClr val="accent1"/>
-          </a:effectRef>
-          <a:fontRef idx="minor">
-            <a:schemeClr val="lt1"/>
-          </a:fontRef>
-        </p:style>
-        <p:txBody>
-          <a:bodyPr wrap="square" rtlCol="0">
-            <a:spAutoFit/>
-          </a:bodyPr>
-          <a:lstStyle/>
-          <a:p>
-            <a:pPr algn="ctr"/>
-            <a:r>
-              <a:rPr lang="fr-FR" sz="4000" dirty="0" smtClean="0"/>
-              <a:t>Début du projet le lundi 22/06/2015</a:t>
-            </a:r>
-            <a:endParaRPr lang="fr-FR" sz="4000" dirty="0"/>
-          </a:p>
-        </p:txBody>
-      </p:sp>
-      <p:sp>
-        <p:nvSpPr>
-          <p:cNvPr id="3" name="Rectangle 2"/>
-          <p:cNvSpPr/>
-          <p:nvPr/>
-        </p:nvSpPr>
-        <p:spPr>
-          <a:xfrm>
-            <a:off x="2315153" y="4365104"/>
-            <a:ext cx="4946818" cy="369332"/>
-          </a:xfrm>
-          <a:prstGeom prst="rect">
-            <a:avLst/>
-          </a:prstGeom>
-        </p:spPr>
-        <p:txBody>
-          <a:bodyPr wrap="square">
-            <a:spAutoFit/>
-          </a:bodyPr>
-          <a:lstStyle/>
-          <a:p>
-            <a:r>
-              <a:rPr lang="fr-FR" b="1" dirty="0" smtClean="0"/>
-              <a:t>D’ici là, bonne chance pour les examens de Juin !</a:t>
-            </a:r>
-            <a:endParaRPr lang="fr-FR" dirty="0" smtClean="0"/>
-          </a:p>
-        </p:txBody>
-      </p:sp>
-      <p:pic>
-        <p:nvPicPr>
-          <p:cNvPr id="2050" name="Picture 2" descr="http://www.google.fr/url?source=imglanding&amp;ct=img&amp;q=http://www.michel-vaillant.com/upload/content/photo116_399.jpg&amp;sa=X&amp;ei=q-Z2VZ7nNcvSUevMgIAM&amp;ved=0CAkQ8wc&amp;usg=AFQjCNHFgmCGio-hujBTxCHvB0YLGczseA"/>
-          <p:cNvPicPr>
-            <a:picLocks noChangeAspect="1" noChangeArrowheads="1"/>
-          </p:cNvPicPr>
-          <p:nvPr/>
-        </p:nvPicPr>
-        <p:blipFill>
-          <a:blip r:embed="rId3">
-            <a:extLst>
-              <a:ext uri="{28A0092B-C50C-407E-A947-70E740481C1C}">
-                <a14:useLocalDpi xmlns:a14="http://schemas.microsoft.com/office/drawing/2010/main" val="0"/>
-              </a:ext>
-            </a:extLst>
-          </a:blip>
-          <a:srcRect/>
-          <a:stretch>
-            <a:fillRect/>
-          </a:stretch>
-        </p:blipFill>
-        <p:spPr bwMode="auto">
-          <a:xfrm>
-            <a:off x="220106" y="4077072"/>
-            <a:ext cx="1681847" cy="1655361"/>
-          </a:xfrm>
-          <a:prstGeom prst="rect">
-            <a:avLst/>
-          </a:prstGeom>
-          <a:noFill/>
-          <a:extLst>
-            <a:ext uri="{909E8E84-426E-40DD-AFC4-6F175D3DCCD1}">
-              <a14:hiddenFill xmlns:a14="http://schemas.microsoft.com/office/drawing/2010/main">
-                <a:solidFill>
-                  <a:srgbClr val="FFFFFF"/>
-                </a:solidFill>
-              </a14:hiddenFill>
-            </a:ext>
-          </a:extLst>
-        </p:spPr>
-      </p:pic>
-      <p:sp>
-        <p:nvSpPr>
-          <p:cNvPr id="2" name="AutoShape 4"/>
-          <p:cNvSpPr>
-            <a:spLocks noChangeAspect="1" noChangeArrowheads="1"/>
-          </p:cNvSpPr>
-          <p:nvPr/>
-        </p:nvSpPr>
-        <p:spPr bwMode="auto">
-          <a:xfrm>
-            <a:off x="63500" y="-136525"/>
-            <a:ext cx="2143125" cy="2143125"/>
-          </a:xfrm>
-          <a:prstGeom prst="rect">
-            <a:avLst/>
-          </a:prstGeom>
-          <a:noFill/>
-          <a:extLst>
-            <a:ext uri="{909E8E84-426E-40DD-AFC4-6F175D3DCCD1}">
-              <a14:hiddenFill xmlns:a14="http://schemas.microsoft.com/office/drawing/2010/main">
-                <a:solidFill>
-                  <a:srgbClr val="FFFFFF"/>
-                </a:solidFill>
-              </a14:hiddenFill>
-            </a:ext>
-          </a:extLst>
-        </p:spPr>
-        <p:txBody>
-          <a:bodyPr vert="horz" wrap="square" lIns="91440" tIns="45720" rIns="91440" bIns="45720" numCol="1" anchor="t" anchorCtr="0" compatLnSpc="1">
-            <a:prstTxWarp prst="textNoShape">
-              <a:avLst/>
-            </a:prstTxWarp>
-          </a:bodyPr>
-          <a:lstStyle/>
-          <a:p>
-            <a:endParaRPr lang="fr-FR"/>
-          </a:p>
-        </p:txBody>
-      </p:sp>
-      <p:pic>
-        <p:nvPicPr>
-          <p:cNvPr id="2054" name="Picture 6" descr="http://www.google.fr/url?source=imglanding&amp;ct=img&amp;q=http://ekladata.com/YKU_jsvfwxIZQ1YuqO-wR9wcIgc.jpg&amp;sa=X&amp;ei=2-Z2VcOBGMn5UIWwgugG&amp;ved=0CAkQ8wc&amp;usg=AFQjCNGS6MN2WXzseH5fPJnsyY-kAJjhlg"/>
-          <p:cNvPicPr>
-            <a:picLocks noChangeAspect="1" noChangeArrowheads="1"/>
-          </p:cNvPicPr>
-          <p:nvPr/>
-        </p:nvPicPr>
-        <p:blipFill>
-          <a:blip r:embed="rId4">
-            <a:extLst>
-              <a:ext uri="{28A0092B-C50C-407E-A947-70E740481C1C}">
-                <a14:useLocalDpi xmlns:a14="http://schemas.microsoft.com/office/drawing/2010/main" val="0"/>
-              </a:ext>
-            </a:extLst>
-          </a:blip>
-          <a:srcRect/>
-          <a:stretch>
-            <a:fillRect/>
-          </a:stretch>
-        </p:blipFill>
-        <p:spPr bwMode="auto">
-          <a:xfrm>
-            <a:off x="7331186" y="4190377"/>
-            <a:ext cx="1428750" cy="1428750"/>
-          </a:xfrm>
-          <a:prstGeom prst="rect">
-            <a:avLst/>
-          </a:prstGeom>
-          <a:noFill/>
-          <a:extLst>
-            <a:ext uri="{909E8E84-426E-40DD-AFC4-6F175D3DCCD1}">
-              <a14:hiddenFill xmlns:a14="http://schemas.microsoft.com/office/drawing/2010/main">
-                <a:solidFill>
-                  <a:srgbClr val="FFFFFF"/>
-                </a:solidFill>
-              </a14:hiddenFill>
-            </a:ext>
-          </a:extLst>
-        </p:spPr>
-      </p:pic>
-    </p:spTree>
-    <p:extLst>
-      <p:ext uri="{BB962C8B-B14F-4D97-AF65-F5344CB8AC3E}">
-        <p14:creationId xmlns:p14="http://schemas.microsoft.com/office/powerpoint/2010/main" val="4022729328"/>
       </p:ext>
     </p:extLst>
   </p:cSld>
@@ -23286,7 +22947,6 @@
               <a:rPr lang="fr-FR" dirty="0" smtClean="0"/>
               <a:t>développeurs. C’est là que les fichiers sont ajoutés, supprimés ou modifiés par les développeurs.</a:t>
             </a:r>
-            <a:endParaRPr lang="fr-FR" dirty="0" smtClean="0"/>
           </a:p>
         </p:txBody>
       </p:sp>
@@ -24629,11 +24289,7 @@
           <a:p>
             <a:r>
               <a:rPr lang="fr-FR" dirty="0" smtClean="0"/>
-              <a:t>Ajout du </a:t>
-            </a:r>
-            <a:r>
-              <a:rPr lang="fr-FR" dirty="0" smtClean="0"/>
-              <a:t>user</a:t>
+              <a:t>Ajout du user</a:t>
             </a:r>
             <a:endParaRPr lang="fr-FR" dirty="0"/>
           </a:p>
@@ -24760,7 +24416,6 @@
               <a:rPr lang="fr-FR" dirty="0" smtClean="0"/>
               <a:t> afin que je vous ajoute en tant que contributeur du projet ODE sous Git Hub</a:t>
             </a:r>
-            <a:endParaRPr lang="fr-FR" dirty="0" smtClean="0"/>
           </a:p>
         </p:txBody>
       </p:sp>
@@ -24787,11 +24442,7 @@
           <a:p>
             <a:r>
               <a:rPr lang="fr-FR" dirty="0" smtClean="0"/>
-              <a:t>4.   Le </a:t>
-            </a:r>
-            <a:r>
-              <a:rPr lang="fr-FR" dirty="0" smtClean="0"/>
-              <a:t>compte Git Hub recevra deux mail automatique :</a:t>
+              <a:t>4.   Le compte Git Hub recevra deux mail automatique :</a:t>
             </a:r>
           </a:p>
           <a:p>

</xml_diff>